<commit_message>
Maj diapo revue 2
</commit_message>
<xml_diff>
--- a/oral_projet/revue_2/diaporama_revue_2_steven.pptx
+++ b/oral_projet/revue_2/diaporama_revue_2_steven.pptx
@@ -5,7 +5,7 @@
     <p:sldMasterId id="2147483648" r:id="rId1"/>
   </p:sldMasterIdLst>
   <p:notesMasterIdLst>
-    <p:notesMasterId r:id="rId16"/>
+    <p:notesMasterId r:id="rId17"/>
   </p:notesMasterIdLst>
   <p:sldIdLst>
     <p:sldId id="256" r:id="rId2"/>
@@ -16,12 +16,13 @@
     <p:sldId id="270" r:id="rId7"/>
     <p:sldId id="264" r:id="rId8"/>
     <p:sldId id="266" r:id="rId9"/>
-    <p:sldId id="262" r:id="rId10"/>
-    <p:sldId id="263" r:id="rId11"/>
-    <p:sldId id="268" r:id="rId12"/>
-    <p:sldId id="269" r:id="rId13"/>
+    <p:sldId id="272" r:id="rId10"/>
+    <p:sldId id="262" r:id="rId11"/>
+    <p:sldId id="263" r:id="rId12"/>
+    <p:sldId id="268" r:id="rId13"/>
     <p:sldId id="271" r:id="rId14"/>
-    <p:sldId id="272" r:id="rId15"/>
+    <p:sldId id="269" r:id="rId15"/>
+    <p:sldId id="273" r:id="rId16"/>
   </p:sldIdLst>
   <p:sldSz cx="12192000" cy="6858000"/>
   <p:notesSz cx="6858000" cy="9144000"/>
@@ -214,7 +215,7 @@
           <a:p>
             <a:fld id="{7BEC4371-174F-4615-858D-8B61BA547698}" type="datetimeFigureOut">
               <a:rPr lang="fr-FR" smtClean="0"/>
-              <a:t>12/03/2018</a:t>
+              <a:t>15/03/2018</a:t>
             </a:fld>
             <a:endParaRPr lang="fr-FR"/>
           </a:p>
@@ -628,7 +629,7 @@
           <a:p>
             <a:fld id="{125942D7-A464-4365-815E-3C7EAFC3F152}" type="datetimeFigureOut">
               <a:rPr lang="fr-FR" smtClean="0"/>
-              <a:t>12/03/2018</a:t>
+              <a:t>15/03/2018</a:t>
             </a:fld>
             <a:endParaRPr lang="fr-FR"/>
           </a:p>
@@ -838,7 +839,7 @@
           <a:p>
             <a:fld id="{125942D7-A464-4365-815E-3C7EAFC3F152}" type="datetimeFigureOut">
               <a:rPr lang="fr-FR" smtClean="0"/>
-              <a:t>12/03/2018</a:t>
+              <a:t>15/03/2018</a:t>
             </a:fld>
             <a:endParaRPr lang="fr-FR"/>
           </a:p>
@@ -1058,7 +1059,7 @@
           <a:p>
             <a:fld id="{125942D7-A464-4365-815E-3C7EAFC3F152}" type="datetimeFigureOut">
               <a:rPr lang="fr-FR" smtClean="0"/>
-              <a:t>12/03/2018</a:t>
+              <a:t>15/03/2018</a:t>
             </a:fld>
             <a:endParaRPr lang="fr-FR"/>
           </a:p>
@@ -1268,7 +1269,7 @@
           <a:p>
             <a:fld id="{125942D7-A464-4365-815E-3C7EAFC3F152}" type="datetimeFigureOut">
               <a:rPr lang="fr-FR" smtClean="0"/>
-              <a:t>12/03/2018</a:t>
+              <a:t>15/03/2018</a:t>
             </a:fld>
             <a:endParaRPr lang="fr-FR"/>
           </a:p>
@@ -1555,7 +1556,7 @@
           <a:p>
             <a:fld id="{125942D7-A464-4365-815E-3C7EAFC3F152}" type="datetimeFigureOut">
               <a:rPr lang="fr-FR" smtClean="0"/>
-              <a:t>12/03/2018</a:t>
+              <a:t>15/03/2018</a:t>
             </a:fld>
             <a:endParaRPr lang="fr-FR"/>
           </a:p>
@@ -1832,7 +1833,7 @@
           <a:p>
             <a:fld id="{125942D7-A464-4365-815E-3C7EAFC3F152}" type="datetimeFigureOut">
               <a:rPr lang="fr-FR" smtClean="0"/>
-              <a:t>12/03/2018</a:t>
+              <a:t>15/03/2018</a:t>
             </a:fld>
             <a:endParaRPr lang="fr-FR"/>
           </a:p>
@@ -2256,7 +2257,7 @@
           <a:p>
             <a:fld id="{125942D7-A464-4365-815E-3C7EAFC3F152}" type="datetimeFigureOut">
               <a:rPr lang="fr-FR" smtClean="0"/>
-              <a:t>12/03/2018</a:t>
+              <a:t>15/03/2018</a:t>
             </a:fld>
             <a:endParaRPr lang="fr-FR"/>
           </a:p>
@@ -2409,7 +2410,7 @@
           <a:p>
             <a:fld id="{125942D7-A464-4365-815E-3C7EAFC3F152}" type="datetimeFigureOut">
               <a:rPr lang="fr-FR" smtClean="0"/>
-              <a:t>12/03/2018</a:t>
+              <a:t>15/03/2018</a:t>
             </a:fld>
             <a:endParaRPr lang="fr-FR"/>
           </a:p>
@@ -2534,7 +2535,7 @@
           <a:p>
             <a:fld id="{125942D7-A464-4365-815E-3C7EAFC3F152}" type="datetimeFigureOut">
               <a:rPr lang="fr-FR" smtClean="0"/>
-              <a:t>12/03/2018</a:t>
+              <a:t>15/03/2018</a:t>
             </a:fld>
             <a:endParaRPr lang="fr-FR"/>
           </a:p>
@@ -2857,7 +2858,7 @@
           <a:p>
             <a:fld id="{125942D7-A464-4365-815E-3C7EAFC3F152}" type="datetimeFigureOut">
               <a:rPr lang="fr-FR" smtClean="0"/>
-              <a:t>12/03/2018</a:t>
+              <a:t>15/03/2018</a:t>
             </a:fld>
             <a:endParaRPr lang="fr-FR"/>
           </a:p>
@@ -3157,7 +3158,7 @@
           <a:p>
             <a:fld id="{125942D7-A464-4365-815E-3C7EAFC3F152}" type="datetimeFigureOut">
               <a:rPr lang="fr-FR" smtClean="0"/>
-              <a:t>12/03/2018</a:t>
+              <a:t>15/03/2018</a:t>
             </a:fld>
             <a:endParaRPr lang="fr-FR"/>
           </a:p>
@@ -3410,7 +3411,7 @@
           <a:p>
             <a:fld id="{125942D7-A464-4365-815E-3C7EAFC3F152}" type="datetimeFigureOut">
               <a:rPr lang="fr-FR" smtClean="0"/>
-              <a:t>12/03/2018</a:t>
+              <a:t>15/03/2018</a:t>
             </a:fld>
             <a:endParaRPr lang="fr-FR"/>
           </a:p>
@@ -5308,6 +5309,875 @@
       </p:cxnSp>
       <p:pic>
         <p:nvPicPr>
+          <p:cNvPr id="24" name="Image 23">
+            <a:extLst>
+              <a:ext uri="{FF2B5EF4-FFF2-40B4-BE49-F238E27FC236}">
+                <a16:creationId xmlns:a16="http://schemas.microsoft.com/office/drawing/2014/main" id="{7A11CD42-93A2-4CE9-8917-661C6FDC8EB2}"/>
+              </a:ext>
+            </a:extLst>
+          </p:cNvPr>
+          <p:cNvPicPr>
+            <a:picLocks noChangeAspect="1"/>
+          </p:cNvPicPr>
+          <p:nvPr/>
+        </p:nvPicPr>
+        <p:blipFill>
+          <a:blip r:embed="rId4">
+            <a:extLst>
+              <a:ext uri="{28A0092B-C50C-407E-A947-70E740481C1C}">
+                <a14:useLocalDpi xmlns:a14="http://schemas.microsoft.com/office/drawing/2010/main" val="0"/>
+              </a:ext>
+            </a:extLst>
+          </a:blip>
+          <a:stretch>
+            <a:fillRect/>
+          </a:stretch>
+        </p:blipFill>
+        <p:spPr>
+          <a:xfrm>
+            <a:off x="1655727" y="2046914"/>
+            <a:ext cx="7028292" cy="4777614"/>
+          </a:xfrm>
+          <a:prstGeom prst="rect">
+            <a:avLst/>
+          </a:prstGeom>
+        </p:spPr>
+      </p:pic>
+      <p:sp>
+        <p:nvSpPr>
+          <p:cNvPr id="4" name="ZoneTexte 3">
+            <a:extLst>
+              <a:ext uri="{FF2B5EF4-FFF2-40B4-BE49-F238E27FC236}">
+                <a16:creationId xmlns:a16="http://schemas.microsoft.com/office/drawing/2014/main" id="{E77BD0C0-B104-436D-A198-D80CD647A659}"/>
+              </a:ext>
+            </a:extLst>
+          </p:cNvPr>
+          <p:cNvSpPr txBox="1"/>
+          <p:nvPr/>
+        </p:nvSpPr>
+        <p:spPr>
+          <a:xfrm>
+            <a:off x="2988527" y="691412"/>
+            <a:ext cx="6243927" cy="1446550"/>
+          </a:xfrm>
+          <a:prstGeom prst="rect">
+            <a:avLst/>
+          </a:prstGeom>
+          <a:noFill/>
+        </p:spPr>
+        <p:txBody>
+          <a:bodyPr wrap="square" rtlCol="0">
+            <a:spAutoFit/>
+          </a:bodyPr>
+          <a:lstStyle/>
+          <a:p>
+            <a:r>
+              <a:rPr lang="fr-FR" sz="4400" dirty="0">
+                <a:latin typeface="Berlin Sans FB" panose="020E0602020502020306" pitchFamily="34" charset="0"/>
+              </a:rPr>
+              <a:t>Diagramme de cas d’utilisation</a:t>
+            </a:r>
+          </a:p>
+        </p:txBody>
+      </p:sp>
+    </p:spTree>
+    <p:extLst>
+      <p:ext uri="{BB962C8B-B14F-4D97-AF65-F5344CB8AC3E}">
+        <p14:creationId xmlns:p14="http://schemas.microsoft.com/office/powerpoint/2010/main" val="2016876074"/>
+      </p:ext>
+    </p:extLst>
+  </p:cSld>
+  <p:clrMapOvr>
+    <a:masterClrMapping/>
+  </p:clrMapOvr>
+  <mc:AlternateContent xmlns:mc="http://schemas.openxmlformats.org/markup-compatibility/2006" xmlns:p14="http://schemas.microsoft.com/office/powerpoint/2010/main">
+    <mc:Choice Requires="p14">
+      <p:transition spd="slow">
+        <p14:reveal/>
+      </p:transition>
+    </mc:Choice>
+    <mc:Fallback xmlns="">
+      <p:transition spd="slow">
+        <p:fade/>
+      </p:transition>
+    </mc:Fallback>
+  </mc:AlternateContent>
+</p:sld>
+</file>
+
+<file path=ppt/slides/slide11.xml><?xml version="1.0" encoding="utf-8"?>
+<p:sld xmlns:a="http://schemas.openxmlformats.org/drawingml/2006/main" xmlns:r="http://schemas.openxmlformats.org/officeDocument/2006/relationships" xmlns:p="http://schemas.openxmlformats.org/presentationml/2006/main">
+  <p:cSld>
+    <p:spTree>
+      <p:nvGrpSpPr>
+        <p:cNvPr id="1" name=""/>
+        <p:cNvGrpSpPr/>
+        <p:nvPr/>
+      </p:nvGrpSpPr>
+      <p:grpSpPr>
+        <a:xfrm>
+          <a:off x="0" y="0"/>
+          <a:ext cx="0" cy="0"/>
+          <a:chOff x="0" y="0"/>
+          <a:chExt cx="0" cy="0"/>
+        </a:xfrm>
+      </p:grpSpPr>
+      <p:pic>
+        <p:nvPicPr>
+          <p:cNvPr id="8" name="Image 7">
+            <a:extLst>
+              <a:ext uri="{FF2B5EF4-FFF2-40B4-BE49-F238E27FC236}">
+                <a16:creationId xmlns:a16="http://schemas.microsoft.com/office/drawing/2014/main" id="{2BB825C5-31DA-4A56-85EA-536DBF510A31}"/>
+              </a:ext>
+            </a:extLst>
+          </p:cNvPr>
+          <p:cNvPicPr>
+            <a:picLocks noChangeAspect="1"/>
+          </p:cNvPicPr>
+          <p:nvPr/>
+        </p:nvPicPr>
+        <p:blipFill>
+          <a:blip r:embed="rId2">
+            <a:extLst>
+              <a:ext uri="{28A0092B-C50C-407E-A947-70E740481C1C}">
+                <a14:useLocalDpi xmlns:a14="http://schemas.microsoft.com/office/drawing/2010/main" val="0"/>
+              </a:ext>
+            </a:extLst>
+          </a:blip>
+          <a:stretch>
+            <a:fillRect/>
+          </a:stretch>
+        </p:blipFill>
+        <p:spPr>
+          <a:xfrm>
+            <a:off x="1068751" y="66457"/>
+            <a:ext cx="1259497" cy="776690"/>
+          </a:xfrm>
+          <a:prstGeom prst="rect">
+            <a:avLst/>
+          </a:prstGeom>
+        </p:spPr>
+      </p:pic>
+      <p:pic>
+        <p:nvPicPr>
+          <p:cNvPr id="10" name="Image 9">
+            <a:extLst>
+              <a:ext uri="{FF2B5EF4-FFF2-40B4-BE49-F238E27FC236}">
+                <a16:creationId xmlns:a16="http://schemas.microsoft.com/office/drawing/2014/main" id="{8EE7436F-49F2-41E0-93E4-D247B4705294}"/>
+              </a:ext>
+            </a:extLst>
+          </p:cNvPr>
+          <p:cNvPicPr>
+            <a:picLocks noChangeAspect="1"/>
+          </p:cNvPicPr>
+          <p:nvPr/>
+        </p:nvPicPr>
+        <p:blipFill>
+          <a:blip r:embed="rId3">
+            <a:extLst>
+              <a:ext uri="{28A0092B-C50C-407E-A947-70E740481C1C}">
+                <a14:useLocalDpi xmlns:a14="http://schemas.microsoft.com/office/drawing/2010/main" val="0"/>
+              </a:ext>
+            </a:extLst>
+          </a:blip>
+          <a:stretch>
+            <a:fillRect/>
+          </a:stretch>
+        </p:blipFill>
+        <p:spPr>
+          <a:xfrm>
+            <a:off x="9681085" y="238153"/>
+            <a:ext cx="1802101" cy="569807"/>
+          </a:xfrm>
+          <a:prstGeom prst="rect">
+            <a:avLst/>
+          </a:prstGeom>
+        </p:spPr>
+      </p:pic>
+      <p:cxnSp>
+        <p:nvCxnSpPr>
+          <p:cNvPr id="16" name="Connecteur droit 15">
+            <a:extLst>
+              <a:ext uri="{FF2B5EF4-FFF2-40B4-BE49-F238E27FC236}">
+                <a16:creationId xmlns:a16="http://schemas.microsoft.com/office/drawing/2014/main" id="{7319284A-BD6F-4A96-8E2B-E0A4B52E53C6}"/>
+              </a:ext>
+            </a:extLst>
+          </p:cNvPr>
+          <p:cNvCxnSpPr>
+            <a:cxnSpLocks/>
+          </p:cNvCxnSpPr>
+          <p:nvPr/>
+        </p:nvCxnSpPr>
+        <p:spPr>
+          <a:xfrm flipV="1">
+            <a:off x="0" y="454803"/>
+            <a:ext cx="738231" cy="1798"/>
+          </a:xfrm>
+          <a:prstGeom prst="line">
+            <a:avLst/>
+          </a:prstGeom>
+        </p:spPr>
+        <p:style>
+          <a:lnRef idx="3">
+            <a:schemeClr val="dk1"/>
+          </a:lnRef>
+          <a:fillRef idx="0">
+            <a:schemeClr val="dk1"/>
+          </a:fillRef>
+          <a:effectRef idx="2">
+            <a:schemeClr val="dk1"/>
+          </a:effectRef>
+          <a:fontRef idx="minor">
+            <a:schemeClr val="tx1"/>
+          </a:fontRef>
+        </p:style>
+      </p:cxnSp>
+      <p:cxnSp>
+        <p:nvCxnSpPr>
+          <p:cNvPr id="20" name="Connecteur droit 19">
+            <a:extLst>
+              <a:ext uri="{FF2B5EF4-FFF2-40B4-BE49-F238E27FC236}">
+                <a16:creationId xmlns:a16="http://schemas.microsoft.com/office/drawing/2014/main" id="{08874CF7-F149-4C81-B61E-74E18342BA8A}"/>
+              </a:ext>
+            </a:extLst>
+          </p:cNvPr>
+          <p:cNvCxnSpPr>
+            <a:cxnSpLocks/>
+          </p:cNvCxnSpPr>
+          <p:nvPr/>
+        </p:nvCxnSpPr>
+        <p:spPr>
+          <a:xfrm>
+            <a:off x="2573222" y="454803"/>
+            <a:ext cx="6829482" cy="10398"/>
+          </a:xfrm>
+          <a:prstGeom prst="line">
+            <a:avLst/>
+          </a:prstGeom>
+        </p:spPr>
+        <p:style>
+          <a:lnRef idx="3">
+            <a:schemeClr val="dk1"/>
+          </a:lnRef>
+          <a:fillRef idx="0">
+            <a:schemeClr val="dk1"/>
+          </a:fillRef>
+          <a:effectRef idx="2">
+            <a:schemeClr val="dk1"/>
+          </a:effectRef>
+          <a:fontRef idx="minor">
+            <a:schemeClr val="tx1"/>
+          </a:fontRef>
+        </p:style>
+      </p:cxnSp>
+      <p:cxnSp>
+        <p:nvCxnSpPr>
+          <p:cNvPr id="26" name="Connecteur droit 25">
+            <a:extLst>
+              <a:ext uri="{FF2B5EF4-FFF2-40B4-BE49-F238E27FC236}">
+                <a16:creationId xmlns:a16="http://schemas.microsoft.com/office/drawing/2014/main" id="{BB3B35CC-057B-48C1-880F-3306A6559175}"/>
+              </a:ext>
+            </a:extLst>
+          </p:cNvPr>
+          <p:cNvCxnSpPr>
+            <a:cxnSpLocks/>
+          </p:cNvCxnSpPr>
+          <p:nvPr/>
+        </p:nvCxnSpPr>
+        <p:spPr>
+          <a:xfrm>
+            <a:off x="738231" y="454803"/>
+            <a:ext cx="344203" cy="484764"/>
+          </a:xfrm>
+          <a:prstGeom prst="line">
+            <a:avLst/>
+          </a:prstGeom>
+        </p:spPr>
+        <p:style>
+          <a:lnRef idx="3">
+            <a:schemeClr val="dk1"/>
+          </a:lnRef>
+          <a:fillRef idx="0">
+            <a:schemeClr val="dk1"/>
+          </a:fillRef>
+          <a:effectRef idx="2">
+            <a:schemeClr val="dk1"/>
+          </a:effectRef>
+          <a:fontRef idx="minor">
+            <a:schemeClr val="tx1"/>
+          </a:fontRef>
+        </p:style>
+      </p:cxnSp>
+      <p:cxnSp>
+        <p:nvCxnSpPr>
+          <p:cNvPr id="32" name="Connecteur droit 31">
+            <a:extLst>
+              <a:ext uri="{FF2B5EF4-FFF2-40B4-BE49-F238E27FC236}">
+                <a16:creationId xmlns:a16="http://schemas.microsoft.com/office/drawing/2014/main" id="{4AD96496-1EB6-4E48-9BB2-5C255495C686}"/>
+              </a:ext>
+            </a:extLst>
+          </p:cNvPr>
+          <p:cNvCxnSpPr>
+            <a:cxnSpLocks/>
+          </p:cNvCxnSpPr>
+          <p:nvPr/>
+        </p:nvCxnSpPr>
+        <p:spPr>
+          <a:xfrm>
+            <a:off x="1082434" y="938268"/>
+            <a:ext cx="1146585" cy="0"/>
+          </a:xfrm>
+          <a:prstGeom prst="line">
+            <a:avLst/>
+          </a:prstGeom>
+        </p:spPr>
+        <p:style>
+          <a:lnRef idx="3">
+            <a:schemeClr val="dk1"/>
+          </a:lnRef>
+          <a:fillRef idx="0">
+            <a:schemeClr val="dk1"/>
+          </a:fillRef>
+          <a:effectRef idx="2">
+            <a:schemeClr val="dk1"/>
+          </a:effectRef>
+          <a:fontRef idx="minor">
+            <a:schemeClr val="tx1"/>
+          </a:fontRef>
+        </p:style>
+      </p:cxnSp>
+      <p:cxnSp>
+        <p:nvCxnSpPr>
+          <p:cNvPr id="51" name="Connecteur droit 50">
+            <a:extLst>
+              <a:ext uri="{FF2B5EF4-FFF2-40B4-BE49-F238E27FC236}">
+                <a16:creationId xmlns:a16="http://schemas.microsoft.com/office/drawing/2014/main" id="{C035BFA6-ECBF-4775-BA81-19D2CA41AA8D}"/>
+              </a:ext>
+            </a:extLst>
+          </p:cNvPr>
+          <p:cNvCxnSpPr>
+            <a:cxnSpLocks/>
+          </p:cNvCxnSpPr>
+          <p:nvPr/>
+        </p:nvCxnSpPr>
+        <p:spPr>
+          <a:xfrm>
+            <a:off x="9402704" y="465201"/>
+            <a:ext cx="344203" cy="495163"/>
+          </a:xfrm>
+          <a:prstGeom prst="line">
+            <a:avLst/>
+          </a:prstGeom>
+        </p:spPr>
+        <p:style>
+          <a:lnRef idx="3">
+            <a:schemeClr val="dk1"/>
+          </a:lnRef>
+          <a:fillRef idx="0">
+            <a:schemeClr val="dk1"/>
+          </a:fillRef>
+          <a:effectRef idx="2">
+            <a:schemeClr val="dk1"/>
+          </a:effectRef>
+          <a:fontRef idx="minor">
+            <a:schemeClr val="tx1"/>
+          </a:fontRef>
+        </p:style>
+      </p:cxnSp>
+      <p:cxnSp>
+        <p:nvCxnSpPr>
+          <p:cNvPr id="52" name="Connecteur droit 51">
+            <a:extLst>
+              <a:ext uri="{FF2B5EF4-FFF2-40B4-BE49-F238E27FC236}">
+                <a16:creationId xmlns:a16="http://schemas.microsoft.com/office/drawing/2014/main" id="{FA310BC7-694B-4984-99A2-61A1F4F6EBF9}"/>
+              </a:ext>
+            </a:extLst>
+          </p:cNvPr>
+          <p:cNvCxnSpPr>
+            <a:cxnSpLocks/>
+          </p:cNvCxnSpPr>
+          <p:nvPr/>
+        </p:nvCxnSpPr>
+        <p:spPr>
+          <a:xfrm flipH="1">
+            <a:off x="11370469" y="448308"/>
+            <a:ext cx="364332" cy="501657"/>
+          </a:xfrm>
+          <a:prstGeom prst="line">
+            <a:avLst/>
+          </a:prstGeom>
+        </p:spPr>
+        <p:style>
+          <a:lnRef idx="3">
+            <a:schemeClr val="dk1"/>
+          </a:lnRef>
+          <a:fillRef idx="0">
+            <a:schemeClr val="dk1"/>
+          </a:fillRef>
+          <a:effectRef idx="2">
+            <a:schemeClr val="dk1"/>
+          </a:effectRef>
+          <a:fontRef idx="minor">
+            <a:schemeClr val="tx1"/>
+          </a:fontRef>
+        </p:style>
+      </p:cxnSp>
+      <p:cxnSp>
+        <p:nvCxnSpPr>
+          <p:cNvPr id="53" name="Connecteur droit 52">
+            <a:extLst>
+              <a:ext uri="{FF2B5EF4-FFF2-40B4-BE49-F238E27FC236}">
+                <a16:creationId xmlns:a16="http://schemas.microsoft.com/office/drawing/2014/main" id="{BE0649BD-EE59-4DDA-960F-95B2572F9F13}"/>
+              </a:ext>
+            </a:extLst>
+          </p:cNvPr>
+          <p:cNvCxnSpPr>
+            <a:cxnSpLocks/>
+          </p:cNvCxnSpPr>
+          <p:nvPr/>
+        </p:nvCxnSpPr>
+        <p:spPr>
+          <a:xfrm>
+            <a:off x="9743203" y="949965"/>
+            <a:ext cx="1627266" cy="0"/>
+          </a:xfrm>
+          <a:prstGeom prst="line">
+            <a:avLst/>
+          </a:prstGeom>
+        </p:spPr>
+        <p:style>
+          <a:lnRef idx="3">
+            <a:schemeClr val="dk1"/>
+          </a:lnRef>
+          <a:fillRef idx="0">
+            <a:schemeClr val="dk1"/>
+          </a:fillRef>
+          <a:effectRef idx="2">
+            <a:schemeClr val="dk1"/>
+          </a:effectRef>
+          <a:fontRef idx="minor">
+            <a:schemeClr val="tx1"/>
+          </a:fontRef>
+        </p:style>
+      </p:cxnSp>
+      <p:cxnSp>
+        <p:nvCxnSpPr>
+          <p:cNvPr id="55" name="Connecteur droit 54">
+            <a:extLst>
+              <a:ext uri="{FF2B5EF4-FFF2-40B4-BE49-F238E27FC236}">
+                <a16:creationId xmlns:a16="http://schemas.microsoft.com/office/drawing/2014/main" id="{52AA9200-DAFA-4EEF-AC13-4C7CE82A59EC}"/>
+              </a:ext>
+            </a:extLst>
+          </p:cNvPr>
+          <p:cNvCxnSpPr>
+            <a:cxnSpLocks/>
+          </p:cNvCxnSpPr>
+          <p:nvPr/>
+        </p:nvCxnSpPr>
+        <p:spPr>
+          <a:xfrm>
+            <a:off x="11715750" y="454801"/>
+            <a:ext cx="476249" cy="10400"/>
+          </a:xfrm>
+          <a:prstGeom prst="line">
+            <a:avLst/>
+          </a:prstGeom>
+        </p:spPr>
+        <p:style>
+          <a:lnRef idx="3">
+            <a:schemeClr val="dk1"/>
+          </a:lnRef>
+          <a:fillRef idx="0">
+            <a:schemeClr val="dk1"/>
+          </a:fillRef>
+          <a:effectRef idx="2">
+            <a:schemeClr val="dk1"/>
+          </a:effectRef>
+          <a:fontRef idx="minor">
+            <a:schemeClr val="tx1"/>
+          </a:fontRef>
+        </p:style>
+      </p:cxnSp>
+      <p:cxnSp>
+        <p:nvCxnSpPr>
+          <p:cNvPr id="23" name="Connecteur droit 22">
+            <a:extLst>
+              <a:ext uri="{FF2B5EF4-FFF2-40B4-BE49-F238E27FC236}">
+                <a16:creationId xmlns:a16="http://schemas.microsoft.com/office/drawing/2014/main" id="{BCB092C8-0080-4E56-957E-0046D4C83988}"/>
+              </a:ext>
+            </a:extLst>
+          </p:cNvPr>
+          <p:cNvCxnSpPr>
+            <a:cxnSpLocks/>
+          </p:cNvCxnSpPr>
+          <p:nvPr/>
+        </p:nvCxnSpPr>
+        <p:spPr>
+          <a:xfrm flipH="1">
+            <a:off x="2216372" y="446356"/>
+            <a:ext cx="364332" cy="501657"/>
+          </a:xfrm>
+          <a:prstGeom prst="line">
+            <a:avLst/>
+          </a:prstGeom>
+        </p:spPr>
+        <p:style>
+          <a:lnRef idx="3">
+            <a:schemeClr val="dk1"/>
+          </a:lnRef>
+          <a:fillRef idx="0">
+            <a:schemeClr val="dk1"/>
+          </a:fillRef>
+          <a:effectRef idx="2">
+            <a:schemeClr val="dk1"/>
+          </a:effectRef>
+          <a:fontRef idx="minor">
+            <a:schemeClr val="tx1"/>
+          </a:fontRef>
+        </p:style>
+      </p:cxnSp>
+      <p:pic>
+        <p:nvPicPr>
+          <p:cNvPr id="57" name="Image 56">
+            <a:extLst>
+              <a:ext uri="{FF2B5EF4-FFF2-40B4-BE49-F238E27FC236}">
+                <a16:creationId xmlns:a16="http://schemas.microsoft.com/office/drawing/2014/main" id="{12B16FB2-5844-4B92-AE69-9BAC858C22BB}"/>
+              </a:ext>
+            </a:extLst>
+          </p:cNvPr>
+          <p:cNvPicPr>
+            <a:picLocks noChangeAspect="1"/>
+          </p:cNvPicPr>
+          <p:nvPr/>
+        </p:nvPicPr>
+        <p:blipFill>
+          <a:blip r:embed="rId3">
+            <a:extLst>
+              <a:ext uri="{28A0092B-C50C-407E-A947-70E740481C1C}">
+                <a14:useLocalDpi xmlns:a14="http://schemas.microsoft.com/office/drawing/2010/main" val="0"/>
+              </a:ext>
+            </a:extLst>
+          </a:blip>
+          <a:stretch>
+            <a:fillRect/>
+          </a:stretch>
+        </p:blipFill>
+        <p:spPr>
+          <a:xfrm>
+            <a:off x="9681085" y="238153"/>
+            <a:ext cx="1802101" cy="569807"/>
+          </a:xfrm>
+          <a:prstGeom prst="rect">
+            <a:avLst/>
+          </a:prstGeom>
+        </p:spPr>
+      </p:pic>
+      <p:cxnSp>
+        <p:nvCxnSpPr>
+          <p:cNvPr id="58" name="Connecteur droit 57">
+            <a:extLst>
+              <a:ext uri="{FF2B5EF4-FFF2-40B4-BE49-F238E27FC236}">
+                <a16:creationId xmlns:a16="http://schemas.microsoft.com/office/drawing/2014/main" id="{01599350-F8B0-4FDC-B003-981189A8D654}"/>
+              </a:ext>
+            </a:extLst>
+          </p:cNvPr>
+          <p:cNvCxnSpPr>
+            <a:cxnSpLocks/>
+          </p:cNvCxnSpPr>
+          <p:nvPr/>
+        </p:nvCxnSpPr>
+        <p:spPr>
+          <a:xfrm>
+            <a:off x="2573222" y="454803"/>
+            <a:ext cx="6829482" cy="10398"/>
+          </a:xfrm>
+          <a:prstGeom prst="line">
+            <a:avLst/>
+          </a:prstGeom>
+        </p:spPr>
+        <p:style>
+          <a:lnRef idx="3">
+            <a:schemeClr val="dk1"/>
+          </a:lnRef>
+          <a:fillRef idx="0">
+            <a:schemeClr val="dk1"/>
+          </a:fillRef>
+          <a:effectRef idx="2">
+            <a:schemeClr val="dk1"/>
+          </a:effectRef>
+          <a:fontRef idx="minor">
+            <a:schemeClr val="tx1"/>
+          </a:fontRef>
+        </p:style>
+      </p:cxnSp>
+      <p:cxnSp>
+        <p:nvCxnSpPr>
+          <p:cNvPr id="59" name="Connecteur droit 58">
+            <a:extLst>
+              <a:ext uri="{FF2B5EF4-FFF2-40B4-BE49-F238E27FC236}">
+                <a16:creationId xmlns:a16="http://schemas.microsoft.com/office/drawing/2014/main" id="{BC6E6150-6054-4785-84EC-0C46D82034C2}"/>
+              </a:ext>
+            </a:extLst>
+          </p:cNvPr>
+          <p:cNvCxnSpPr>
+            <a:cxnSpLocks/>
+          </p:cNvCxnSpPr>
+          <p:nvPr/>
+        </p:nvCxnSpPr>
+        <p:spPr>
+          <a:xfrm>
+            <a:off x="738231" y="454803"/>
+            <a:ext cx="344203" cy="484764"/>
+          </a:xfrm>
+          <a:prstGeom prst="line">
+            <a:avLst/>
+          </a:prstGeom>
+        </p:spPr>
+        <p:style>
+          <a:lnRef idx="3">
+            <a:schemeClr val="dk1"/>
+          </a:lnRef>
+          <a:fillRef idx="0">
+            <a:schemeClr val="dk1"/>
+          </a:fillRef>
+          <a:effectRef idx="2">
+            <a:schemeClr val="dk1"/>
+          </a:effectRef>
+          <a:fontRef idx="minor">
+            <a:schemeClr val="tx1"/>
+          </a:fontRef>
+        </p:style>
+      </p:cxnSp>
+      <p:cxnSp>
+        <p:nvCxnSpPr>
+          <p:cNvPr id="60" name="Connecteur droit 59">
+            <a:extLst>
+              <a:ext uri="{FF2B5EF4-FFF2-40B4-BE49-F238E27FC236}">
+                <a16:creationId xmlns:a16="http://schemas.microsoft.com/office/drawing/2014/main" id="{CBC9961A-8EC2-4287-A398-BCA4138D409D}"/>
+              </a:ext>
+            </a:extLst>
+          </p:cNvPr>
+          <p:cNvCxnSpPr>
+            <a:cxnSpLocks/>
+          </p:cNvCxnSpPr>
+          <p:nvPr/>
+        </p:nvCxnSpPr>
+        <p:spPr>
+          <a:xfrm>
+            <a:off x="1082434" y="938268"/>
+            <a:ext cx="1146585" cy="0"/>
+          </a:xfrm>
+          <a:prstGeom prst="line">
+            <a:avLst/>
+          </a:prstGeom>
+        </p:spPr>
+        <p:style>
+          <a:lnRef idx="3">
+            <a:schemeClr val="dk1"/>
+          </a:lnRef>
+          <a:fillRef idx="0">
+            <a:schemeClr val="dk1"/>
+          </a:fillRef>
+          <a:effectRef idx="2">
+            <a:schemeClr val="dk1"/>
+          </a:effectRef>
+          <a:fontRef idx="minor">
+            <a:schemeClr val="tx1"/>
+          </a:fontRef>
+        </p:style>
+      </p:cxnSp>
+      <p:cxnSp>
+        <p:nvCxnSpPr>
+          <p:cNvPr id="61" name="Connecteur droit 60">
+            <a:extLst>
+              <a:ext uri="{FF2B5EF4-FFF2-40B4-BE49-F238E27FC236}">
+                <a16:creationId xmlns:a16="http://schemas.microsoft.com/office/drawing/2014/main" id="{152B7C45-2543-4665-BC07-4DB71CA9F337}"/>
+              </a:ext>
+            </a:extLst>
+          </p:cNvPr>
+          <p:cNvCxnSpPr>
+            <a:cxnSpLocks/>
+          </p:cNvCxnSpPr>
+          <p:nvPr/>
+        </p:nvCxnSpPr>
+        <p:spPr>
+          <a:xfrm>
+            <a:off x="9402704" y="465201"/>
+            <a:ext cx="344203" cy="495163"/>
+          </a:xfrm>
+          <a:prstGeom prst="line">
+            <a:avLst/>
+          </a:prstGeom>
+        </p:spPr>
+        <p:style>
+          <a:lnRef idx="3">
+            <a:schemeClr val="dk1"/>
+          </a:lnRef>
+          <a:fillRef idx="0">
+            <a:schemeClr val="dk1"/>
+          </a:fillRef>
+          <a:effectRef idx="2">
+            <a:schemeClr val="dk1"/>
+          </a:effectRef>
+          <a:fontRef idx="minor">
+            <a:schemeClr val="tx1"/>
+          </a:fontRef>
+        </p:style>
+      </p:cxnSp>
+      <p:cxnSp>
+        <p:nvCxnSpPr>
+          <p:cNvPr id="62" name="Connecteur droit 61">
+            <a:extLst>
+              <a:ext uri="{FF2B5EF4-FFF2-40B4-BE49-F238E27FC236}">
+                <a16:creationId xmlns:a16="http://schemas.microsoft.com/office/drawing/2014/main" id="{00A84DC3-A112-46A3-B71C-04D85339323D}"/>
+              </a:ext>
+            </a:extLst>
+          </p:cNvPr>
+          <p:cNvCxnSpPr>
+            <a:cxnSpLocks/>
+          </p:cNvCxnSpPr>
+          <p:nvPr/>
+        </p:nvCxnSpPr>
+        <p:spPr>
+          <a:xfrm flipH="1">
+            <a:off x="11370469" y="448308"/>
+            <a:ext cx="364332" cy="501657"/>
+          </a:xfrm>
+          <a:prstGeom prst="line">
+            <a:avLst/>
+          </a:prstGeom>
+        </p:spPr>
+        <p:style>
+          <a:lnRef idx="3">
+            <a:schemeClr val="dk1"/>
+          </a:lnRef>
+          <a:fillRef idx="0">
+            <a:schemeClr val="dk1"/>
+          </a:fillRef>
+          <a:effectRef idx="2">
+            <a:schemeClr val="dk1"/>
+          </a:effectRef>
+          <a:fontRef idx="minor">
+            <a:schemeClr val="tx1"/>
+          </a:fontRef>
+        </p:style>
+      </p:cxnSp>
+      <p:cxnSp>
+        <p:nvCxnSpPr>
+          <p:cNvPr id="63" name="Connecteur droit 62">
+            <a:extLst>
+              <a:ext uri="{FF2B5EF4-FFF2-40B4-BE49-F238E27FC236}">
+                <a16:creationId xmlns:a16="http://schemas.microsoft.com/office/drawing/2014/main" id="{C50788C6-8F68-44EC-AB54-94C1D2FE554D}"/>
+              </a:ext>
+            </a:extLst>
+          </p:cNvPr>
+          <p:cNvCxnSpPr>
+            <a:cxnSpLocks/>
+          </p:cNvCxnSpPr>
+          <p:nvPr/>
+        </p:nvCxnSpPr>
+        <p:spPr>
+          <a:xfrm>
+            <a:off x="9743203" y="949965"/>
+            <a:ext cx="1627266" cy="0"/>
+          </a:xfrm>
+          <a:prstGeom prst="line">
+            <a:avLst/>
+          </a:prstGeom>
+        </p:spPr>
+        <p:style>
+          <a:lnRef idx="3">
+            <a:schemeClr val="dk1"/>
+          </a:lnRef>
+          <a:fillRef idx="0">
+            <a:schemeClr val="dk1"/>
+          </a:fillRef>
+          <a:effectRef idx="2">
+            <a:schemeClr val="dk1"/>
+          </a:effectRef>
+          <a:fontRef idx="minor">
+            <a:schemeClr val="tx1"/>
+          </a:fontRef>
+        </p:style>
+      </p:cxnSp>
+      <p:cxnSp>
+        <p:nvCxnSpPr>
+          <p:cNvPr id="64" name="Connecteur droit 63">
+            <a:extLst>
+              <a:ext uri="{FF2B5EF4-FFF2-40B4-BE49-F238E27FC236}">
+                <a16:creationId xmlns:a16="http://schemas.microsoft.com/office/drawing/2014/main" id="{BC4D4E5F-5636-45CB-873C-EC085AB307A3}"/>
+              </a:ext>
+            </a:extLst>
+          </p:cNvPr>
+          <p:cNvCxnSpPr>
+            <a:cxnSpLocks/>
+          </p:cNvCxnSpPr>
+          <p:nvPr/>
+        </p:nvCxnSpPr>
+        <p:spPr>
+          <a:xfrm>
+            <a:off x="11715750" y="454801"/>
+            <a:ext cx="476249" cy="10400"/>
+          </a:xfrm>
+          <a:prstGeom prst="line">
+            <a:avLst/>
+          </a:prstGeom>
+        </p:spPr>
+        <p:style>
+          <a:lnRef idx="3">
+            <a:schemeClr val="dk1"/>
+          </a:lnRef>
+          <a:fillRef idx="0">
+            <a:schemeClr val="dk1"/>
+          </a:fillRef>
+          <a:effectRef idx="2">
+            <a:schemeClr val="dk1"/>
+          </a:effectRef>
+          <a:fontRef idx="minor">
+            <a:schemeClr val="tx1"/>
+          </a:fontRef>
+        </p:style>
+      </p:cxnSp>
+      <p:cxnSp>
+        <p:nvCxnSpPr>
+          <p:cNvPr id="65" name="Connecteur droit 64">
+            <a:extLst>
+              <a:ext uri="{FF2B5EF4-FFF2-40B4-BE49-F238E27FC236}">
+                <a16:creationId xmlns:a16="http://schemas.microsoft.com/office/drawing/2014/main" id="{E6F6B4C5-0E3B-46C9-859D-EE774175D36F}"/>
+              </a:ext>
+            </a:extLst>
+          </p:cNvPr>
+          <p:cNvCxnSpPr>
+            <a:cxnSpLocks/>
+          </p:cNvCxnSpPr>
+          <p:nvPr/>
+        </p:nvCxnSpPr>
+        <p:spPr>
+          <a:xfrm flipH="1">
+            <a:off x="2216372" y="446356"/>
+            <a:ext cx="364332" cy="501657"/>
+          </a:xfrm>
+          <a:prstGeom prst="line">
+            <a:avLst/>
+          </a:prstGeom>
+        </p:spPr>
+        <p:style>
+          <a:lnRef idx="3">
+            <a:schemeClr val="dk1"/>
+          </a:lnRef>
+          <a:fillRef idx="0">
+            <a:schemeClr val="dk1"/>
+          </a:fillRef>
+          <a:effectRef idx="2">
+            <a:schemeClr val="dk1"/>
+          </a:effectRef>
+          <a:fontRef idx="minor">
+            <a:schemeClr val="tx1"/>
+          </a:fontRef>
+        </p:style>
+      </p:cxnSp>
+      <p:pic>
+        <p:nvPicPr>
           <p:cNvPr id="3" name="Image 2">
             <a:extLst>
               <a:ext uri="{FF2B5EF4-FFF2-40B4-BE49-F238E27FC236}">
@@ -5404,7 +6274,7 @@
 </p:sld>
 </file>
 
-<file path=ppt/slides/slide11.xml><?xml version="1.0" encoding="utf-8"?>
+<file path=ppt/slides/slide12.xml><?xml version="1.0" encoding="utf-8"?>
 <p:sld xmlns:a="http://schemas.openxmlformats.org/drawingml/2006/main" xmlns:r="http://schemas.openxmlformats.org/officeDocument/2006/relationships" xmlns:p="http://schemas.openxmlformats.org/presentationml/2006/main">
   <p:cSld>
     <p:spTree>
@@ -8321,7 +9191,876 @@
 </p:sld>
 </file>
 
-<file path=ppt/slides/slide12.xml><?xml version="1.0" encoding="utf-8"?>
+<file path=ppt/slides/slide13.xml><?xml version="1.0" encoding="utf-8"?>
+<p:sld xmlns:a="http://schemas.openxmlformats.org/drawingml/2006/main" xmlns:r="http://schemas.openxmlformats.org/officeDocument/2006/relationships" xmlns:p="http://schemas.openxmlformats.org/presentationml/2006/main">
+  <p:cSld>
+    <p:spTree>
+      <p:nvGrpSpPr>
+        <p:cNvPr id="1" name=""/>
+        <p:cNvGrpSpPr/>
+        <p:nvPr/>
+      </p:nvGrpSpPr>
+      <p:grpSpPr>
+        <a:xfrm>
+          <a:off x="0" y="0"/>
+          <a:ext cx="0" cy="0"/>
+          <a:chOff x="0" y="0"/>
+          <a:chExt cx="0" cy="0"/>
+        </a:xfrm>
+      </p:grpSpPr>
+      <p:pic>
+        <p:nvPicPr>
+          <p:cNvPr id="8" name="Image 7">
+            <a:extLst>
+              <a:ext uri="{FF2B5EF4-FFF2-40B4-BE49-F238E27FC236}">
+                <a16:creationId xmlns:a16="http://schemas.microsoft.com/office/drawing/2014/main" id="{2BB825C5-31DA-4A56-85EA-536DBF510A31}"/>
+              </a:ext>
+            </a:extLst>
+          </p:cNvPr>
+          <p:cNvPicPr>
+            <a:picLocks noChangeAspect="1"/>
+          </p:cNvPicPr>
+          <p:nvPr/>
+        </p:nvPicPr>
+        <p:blipFill>
+          <a:blip r:embed="rId2">
+            <a:extLst>
+              <a:ext uri="{28A0092B-C50C-407E-A947-70E740481C1C}">
+                <a14:useLocalDpi xmlns:a14="http://schemas.microsoft.com/office/drawing/2010/main" val="0"/>
+              </a:ext>
+            </a:extLst>
+          </a:blip>
+          <a:stretch>
+            <a:fillRect/>
+          </a:stretch>
+        </p:blipFill>
+        <p:spPr>
+          <a:xfrm>
+            <a:off x="1068751" y="66457"/>
+            <a:ext cx="1259497" cy="776690"/>
+          </a:xfrm>
+          <a:prstGeom prst="rect">
+            <a:avLst/>
+          </a:prstGeom>
+        </p:spPr>
+      </p:pic>
+      <p:pic>
+        <p:nvPicPr>
+          <p:cNvPr id="10" name="Image 9">
+            <a:extLst>
+              <a:ext uri="{FF2B5EF4-FFF2-40B4-BE49-F238E27FC236}">
+                <a16:creationId xmlns:a16="http://schemas.microsoft.com/office/drawing/2014/main" id="{8EE7436F-49F2-41E0-93E4-D247B4705294}"/>
+              </a:ext>
+            </a:extLst>
+          </p:cNvPr>
+          <p:cNvPicPr>
+            <a:picLocks noChangeAspect="1"/>
+          </p:cNvPicPr>
+          <p:nvPr/>
+        </p:nvPicPr>
+        <p:blipFill>
+          <a:blip r:embed="rId3">
+            <a:extLst>
+              <a:ext uri="{28A0092B-C50C-407E-A947-70E740481C1C}">
+                <a14:useLocalDpi xmlns:a14="http://schemas.microsoft.com/office/drawing/2010/main" val="0"/>
+              </a:ext>
+            </a:extLst>
+          </a:blip>
+          <a:stretch>
+            <a:fillRect/>
+          </a:stretch>
+        </p:blipFill>
+        <p:spPr>
+          <a:xfrm>
+            <a:off x="9681085" y="238153"/>
+            <a:ext cx="1802101" cy="569807"/>
+          </a:xfrm>
+          <a:prstGeom prst="rect">
+            <a:avLst/>
+          </a:prstGeom>
+        </p:spPr>
+      </p:pic>
+      <p:cxnSp>
+        <p:nvCxnSpPr>
+          <p:cNvPr id="16" name="Connecteur droit 15">
+            <a:extLst>
+              <a:ext uri="{FF2B5EF4-FFF2-40B4-BE49-F238E27FC236}">
+                <a16:creationId xmlns:a16="http://schemas.microsoft.com/office/drawing/2014/main" id="{7319284A-BD6F-4A96-8E2B-E0A4B52E53C6}"/>
+              </a:ext>
+            </a:extLst>
+          </p:cNvPr>
+          <p:cNvCxnSpPr>
+            <a:cxnSpLocks/>
+          </p:cNvCxnSpPr>
+          <p:nvPr/>
+        </p:nvCxnSpPr>
+        <p:spPr>
+          <a:xfrm flipV="1">
+            <a:off x="0" y="454803"/>
+            <a:ext cx="738231" cy="1798"/>
+          </a:xfrm>
+          <a:prstGeom prst="line">
+            <a:avLst/>
+          </a:prstGeom>
+        </p:spPr>
+        <p:style>
+          <a:lnRef idx="3">
+            <a:schemeClr val="dk1"/>
+          </a:lnRef>
+          <a:fillRef idx="0">
+            <a:schemeClr val="dk1"/>
+          </a:fillRef>
+          <a:effectRef idx="2">
+            <a:schemeClr val="dk1"/>
+          </a:effectRef>
+          <a:fontRef idx="minor">
+            <a:schemeClr val="tx1"/>
+          </a:fontRef>
+        </p:style>
+      </p:cxnSp>
+      <p:cxnSp>
+        <p:nvCxnSpPr>
+          <p:cNvPr id="20" name="Connecteur droit 19">
+            <a:extLst>
+              <a:ext uri="{FF2B5EF4-FFF2-40B4-BE49-F238E27FC236}">
+                <a16:creationId xmlns:a16="http://schemas.microsoft.com/office/drawing/2014/main" id="{08874CF7-F149-4C81-B61E-74E18342BA8A}"/>
+              </a:ext>
+            </a:extLst>
+          </p:cNvPr>
+          <p:cNvCxnSpPr>
+            <a:cxnSpLocks/>
+          </p:cNvCxnSpPr>
+          <p:nvPr/>
+        </p:nvCxnSpPr>
+        <p:spPr>
+          <a:xfrm>
+            <a:off x="2573222" y="454803"/>
+            <a:ext cx="6829482" cy="10398"/>
+          </a:xfrm>
+          <a:prstGeom prst="line">
+            <a:avLst/>
+          </a:prstGeom>
+        </p:spPr>
+        <p:style>
+          <a:lnRef idx="3">
+            <a:schemeClr val="dk1"/>
+          </a:lnRef>
+          <a:fillRef idx="0">
+            <a:schemeClr val="dk1"/>
+          </a:fillRef>
+          <a:effectRef idx="2">
+            <a:schemeClr val="dk1"/>
+          </a:effectRef>
+          <a:fontRef idx="minor">
+            <a:schemeClr val="tx1"/>
+          </a:fontRef>
+        </p:style>
+      </p:cxnSp>
+      <p:cxnSp>
+        <p:nvCxnSpPr>
+          <p:cNvPr id="26" name="Connecteur droit 25">
+            <a:extLst>
+              <a:ext uri="{FF2B5EF4-FFF2-40B4-BE49-F238E27FC236}">
+                <a16:creationId xmlns:a16="http://schemas.microsoft.com/office/drawing/2014/main" id="{BB3B35CC-057B-48C1-880F-3306A6559175}"/>
+              </a:ext>
+            </a:extLst>
+          </p:cNvPr>
+          <p:cNvCxnSpPr>
+            <a:cxnSpLocks/>
+          </p:cNvCxnSpPr>
+          <p:nvPr/>
+        </p:nvCxnSpPr>
+        <p:spPr>
+          <a:xfrm>
+            <a:off x="738231" y="454803"/>
+            <a:ext cx="344203" cy="484764"/>
+          </a:xfrm>
+          <a:prstGeom prst="line">
+            <a:avLst/>
+          </a:prstGeom>
+        </p:spPr>
+        <p:style>
+          <a:lnRef idx="3">
+            <a:schemeClr val="dk1"/>
+          </a:lnRef>
+          <a:fillRef idx="0">
+            <a:schemeClr val="dk1"/>
+          </a:fillRef>
+          <a:effectRef idx="2">
+            <a:schemeClr val="dk1"/>
+          </a:effectRef>
+          <a:fontRef idx="minor">
+            <a:schemeClr val="tx1"/>
+          </a:fontRef>
+        </p:style>
+      </p:cxnSp>
+      <p:cxnSp>
+        <p:nvCxnSpPr>
+          <p:cNvPr id="32" name="Connecteur droit 31">
+            <a:extLst>
+              <a:ext uri="{FF2B5EF4-FFF2-40B4-BE49-F238E27FC236}">
+                <a16:creationId xmlns:a16="http://schemas.microsoft.com/office/drawing/2014/main" id="{4AD96496-1EB6-4E48-9BB2-5C255495C686}"/>
+              </a:ext>
+            </a:extLst>
+          </p:cNvPr>
+          <p:cNvCxnSpPr>
+            <a:cxnSpLocks/>
+          </p:cNvCxnSpPr>
+          <p:nvPr/>
+        </p:nvCxnSpPr>
+        <p:spPr>
+          <a:xfrm>
+            <a:off x="1082434" y="938268"/>
+            <a:ext cx="1146585" cy="0"/>
+          </a:xfrm>
+          <a:prstGeom prst="line">
+            <a:avLst/>
+          </a:prstGeom>
+        </p:spPr>
+        <p:style>
+          <a:lnRef idx="3">
+            <a:schemeClr val="dk1"/>
+          </a:lnRef>
+          <a:fillRef idx="0">
+            <a:schemeClr val="dk1"/>
+          </a:fillRef>
+          <a:effectRef idx="2">
+            <a:schemeClr val="dk1"/>
+          </a:effectRef>
+          <a:fontRef idx="minor">
+            <a:schemeClr val="tx1"/>
+          </a:fontRef>
+        </p:style>
+      </p:cxnSp>
+      <p:cxnSp>
+        <p:nvCxnSpPr>
+          <p:cNvPr id="51" name="Connecteur droit 50">
+            <a:extLst>
+              <a:ext uri="{FF2B5EF4-FFF2-40B4-BE49-F238E27FC236}">
+                <a16:creationId xmlns:a16="http://schemas.microsoft.com/office/drawing/2014/main" id="{C035BFA6-ECBF-4775-BA81-19D2CA41AA8D}"/>
+              </a:ext>
+            </a:extLst>
+          </p:cNvPr>
+          <p:cNvCxnSpPr>
+            <a:cxnSpLocks/>
+          </p:cNvCxnSpPr>
+          <p:nvPr/>
+        </p:nvCxnSpPr>
+        <p:spPr>
+          <a:xfrm>
+            <a:off x="9402704" y="465201"/>
+            <a:ext cx="344203" cy="495163"/>
+          </a:xfrm>
+          <a:prstGeom prst="line">
+            <a:avLst/>
+          </a:prstGeom>
+        </p:spPr>
+        <p:style>
+          <a:lnRef idx="3">
+            <a:schemeClr val="dk1"/>
+          </a:lnRef>
+          <a:fillRef idx="0">
+            <a:schemeClr val="dk1"/>
+          </a:fillRef>
+          <a:effectRef idx="2">
+            <a:schemeClr val="dk1"/>
+          </a:effectRef>
+          <a:fontRef idx="minor">
+            <a:schemeClr val="tx1"/>
+          </a:fontRef>
+        </p:style>
+      </p:cxnSp>
+      <p:cxnSp>
+        <p:nvCxnSpPr>
+          <p:cNvPr id="52" name="Connecteur droit 51">
+            <a:extLst>
+              <a:ext uri="{FF2B5EF4-FFF2-40B4-BE49-F238E27FC236}">
+                <a16:creationId xmlns:a16="http://schemas.microsoft.com/office/drawing/2014/main" id="{FA310BC7-694B-4984-99A2-61A1F4F6EBF9}"/>
+              </a:ext>
+            </a:extLst>
+          </p:cNvPr>
+          <p:cNvCxnSpPr>
+            <a:cxnSpLocks/>
+          </p:cNvCxnSpPr>
+          <p:nvPr/>
+        </p:nvCxnSpPr>
+        <p:spPr>
+          <a:xfrm flipH="1">
+            <a:off x="11370469" y="448308"/>
+            <a:ext cx="364332" cy="501657"/>
+          </a:xfrm>
+          <a:prstGeom prst="line">
+            <a:avLst/>
+          </a:prstGeom>
+        </p:spPr>
+        <p:style>
+          <a:lnRef idx="3">
+            <a:schemeClr val="dk1"/>
+          </a:lnRef>
+          <a:fillRef idx="0">
+            <a:schemeClr val="dk1"/>
+          </a:fillRef>
+          <a:effectRef idx="2">
+            <a:schemeClr val="dk1"/>
+          </a:effectRef>
+          <a:fontRef idx="minor">
+            <a:schemeClr val="tx1"/>
+          </a:fontRef>
+        </p:style>
+      </p:cxnSp>
+      <p:cxnSp>
+        <p:nvCxnSpPr>
+          <p:cNvPr id="53" name="Connecteur droit 52">
+            <a:extLst>
+              <a:ext uri="{FF2B5EF4-FFF2-40B4-BE49-F238E27FC236}">
+                <a16:creationId xmlns:a16="http://schemas.microsoft.com/office/drawing/2014/main" id="{BE0649BD-EE59-4DDA-960F-95B2572F9F13}"/>
+              </a:ext>
+            </a:extLst>
+          </p:cNvPr>
+          <p:cNvCxnSpPr>
+            <a:cxnSpLocks/>
+          </p:cNvCxnSpPr>
+          <p:nvPr/>
+        </p:nvCxnSpPr>
+        <p:spPr>
+          <a:xfrm>
+            <a:off x="9743203" y="949965"/>
+            <a:ext cx="1627266" cy="0"/>
+          </a:xfrm>
+          <a:prstGeom prst="line">
+            <a:avLst/>
+          </a:prstGeom>
+        </p:spPr>
+        <p:style>
+          <a:lnRef idx="3">
+            <a:schemeClr val="dk1"/>
+          </a:lnRef>
+          <a:fillRef idx="0">
+            <a:schemeClr val="dk1"/>
+          </a:fillRef>
+          <a:effectRef idx="2">
+            <a:schemeClr val="dk1"/>
+          </a:effectRef>
+          <a:fontRef idx="minor">
+            <a:schemeClr val="tx1"/>
+          </a:fontRef>
+        </p:style>
+      </p:cxnSp>
+      <p:cxnSp>
+        <p:nvCxnSpPr>
+          <p:cNvPr id="55" name="Connecteur droit 54">
+            <a:extLst>
+              <a:ext uri="{FF2B5EF4-FFF2-40B4-BE49-F238E27FC236}">
+                <a16:creationId xmlns:a16="http://schemas.microsoft.com/office/drawing/2014/main" id="{52AA9200-DAFA-4EEF-AC13-4C7CE82A59EC}"/>
+              </a:ext>
+            </a:extLst>
+          </p:cNvPr>
+          <p:cNvCxnSpPr>
+            <a:cxnSpLocks/>
+          </p:cNvCxnSpPr>
+          <p:nvPr/>
+        </p:nvCxnSpPr>
+        <p:spPr>
+          <a:xfrm>
+            <a:off x="11715750" y="454801"/>
+            <a:ext cx="476249" cy="10400"/>
+          </a:xfrm>
+          <a:prstGeom prst="line">
+            <a:avLst/>
+          </a:prstGeom>
+        </p:spPr>
+        <p:style>
+          <a:lnRef idx="3">
+            <a:schemeClr val="dk1"/>
+          </a:lnRef>
+          <a:fillRef idx="0">
+            <a:schemeClr val="dk1"/>
+          </a:fillRef>
+          <a:effectRef idx="2">
+            <a:schemeClr val="dk1"/>
+          </a:effectRef>
+          <a:fontRef idx="minor">
+            <a:schemeClr val="tx1"/>
+          </a:fontRef>
+        </p:style>
+      </p:cxnSp>
+      <p:cxnSp>
+        <p:nvCxnSpPr>
+          <p:cNvPr id="23" name="Connecteur droit 22">
+            <a:extLst>
+              <a:ext uri="{FF2B5EF4-FFF2-40B4-BE49-F238E27FC236}">
+                <a16:creationId xmlns:a16="http://schemas.microsoft.com/office/drawing/2014/main" id="{BCB092C8-0080-4E56-957E-0046D4C83988}"/>
+              </a:ext>
+            </a:extLst>
+          </p:cNvPr>
+          <p:cNvCxnSpPr>
+            <a:cxnSpLocks/>
+          </p:cNvCxnSpPr>
+          <p:nvPr/>
+        </p:nvCxnSpPr>
+        <p:spPr>
+          <a:xfrm flipH="1">
+            <a:off x="2216372" y="446356"/>
+            <a:ext cx="364332" cy="501657"/>
+          </a:xfrm>
+          <a:prstGeom prst="line">
+            <a:avLst/>
+          </a:prstGeom>
+        </p:spPr>
+        <p:style>
+          <a:lnRef idx="3">
+            <a:schemeClr val="dk1"/>
+          </a:lnRef>
+          <a:fillRef idx="0">
+            <a:schemeClr val="dk1"/>
+          </a:fillRef>
+          <a:effectRef idx="2">
+            <a:schemeClr val="dk1"/>
+          </a:effectRef>
+          <a:fontRef idx="minor">
+            <a:schemeClr val="tx1"/>
+          </a:fontRef>
+        </p:style>
+      </p:cxnSp>
+      <p:pic>
+        <p:nvPicPr>
+          <p:cNvPr id="57" name="Image 56">
+            <a:extLst>
+              <a:ext uri="{FF2B5EF4-FFF2-40B4-BE49-F238E27FC236}">
+                <a16:creationId xmlns:a16="http://schemas.microsoft.com/office/drawing/2014/main" id="{12B16FB2-5844-4B92-AE69-9BAC858C22BB}"/>
+              </a:ext>
+            </a:extLst>
+          </p:cNvPr>
+          <p:cNvPicPr>
+            <a:picLocks noChangeAspect="1"/>
+          </p:cNvPicPr>
+          <p:nvPr/>
+        </p:nvPicPr>
+        <p:blipFill>
+          <a:blip r:embed="rId3">
+            <a:extLst>
+              <a:ext uri="{28A0092B-C50C-407E-A947-70E740481C1C}">
+                <a14:useLocalDpi xmlns:a14="http://schemas.microsoft.com/office/drawing/2010/main" val="0"/>
+              </a:ext>
+            </a:extLst>
+          </a:blip>
+          <a:stretch>
+            <a:fillRect/>
+          </a:stretch>
+        </p:blipFill>
+        <p:spPr>
+          <a:xfrm>
+            <a:off x="9681085" y="238153"/>
+            <a:ext cx="1802101" cy="569807"/>
+          </a:xfrm>
+          <a:prstGeom prst="rect">
+            <a:avLst/>
+          </a:prstGeom>
+        </p:spPr>
+      </p:pic>
+      <p:cxnSp>
+        <p:nvCxnSpPr>
+          <p:cNvPr id="58" name="Connecteur droit 57">
+            <a:extLst>
+              <a:ext uri="{FF2B5EF4-FFF2-40B4-BE49-F238E27FC236}">
+                <a16:creationId xmlns:a16="http://schemas.microsoft.com/office/drawing/2014/main" id="{01599350-F8B0-4FDC-B003-981189A8D654}"/>
+              </a:ext>
+            </a:extLst>
+          </p:cNvPr>
+          <p:cNvCxnSpPr>
+            <a:cxnSpLocks/>
+          </p:cNvCxnSpPr>
+          <p:nvPr/>
+        </p:nvCxnSpPr>
+        <p:spPr>
+          <a:xfrm>
+            <a:off x="2573222" y="454803"/>
+            <a:ext cx="6829482" cy="10398"/>
+          </a:xfrm>
+          <a:prstGeom prst="line">
+            <a:avLst/>
+          </a:prstGeom>
+        </p:spPr>
+        <p:style>
+          <a:lnRef idx="3">
+            <a:schemeClr val="dk1"/>
+          </a:lnRef>
+          <a:fillRef idx="0">
+            <a:schemeClr val="dk1"/>
+          </a:fillRef>
+          <a:effectRef idx="2">
+            <a:schemeClr val="dk1"/>
+          </a:effectRef>
+          <a:fontRef idx="minor">
+            <a:schemeClr val="tx1"/>
+          </a:fontRef>
+        </p:style>
+      </p:cxnSp>
+      <p:cxnSp>
+        <p:nvCxnSpPr>
+          <p:cNvPr id="59" name="Connecteur droit 58">
+            <a:extLst>
+              <a:ext uri="{FF2B5EF4-FFF2-40B4-BE49-F238E27FC236}">
+                <a16:creationId xmlns:a16="http://schemas.microsoft.com/office/drawing/2014/main" id="{BC6E6150-6054-4785-84EC-0C46D82034C2}"/>
+              </a:ext>
+            </a:extLst>
+          </p:cNvPr>
+          <p:cNvCxnSpPr>
+            <a:cxnSpLocks/>
+          </p:cNvCxnSpPr>
+          <p:nvPr/>
+        </p:nvCxnSpPr>
+        <p:spPr>
+          <a:xfrm>
+            <a:off x="738231" y="454803"/>
+            <a:ext cx="344203" cy="484764"/>
+          </a:xfrm>
+          <a:prstGeom prst="line">
+            <a:avLst/>
+          </a:prstGeom>
+        </p:spPr>
+        <p:style>
+          <a:lnRef idx="3">
+            <a:schemeClr val="dk1"/>
+          </a:lnRef>
+          <a:fillRef idx="0">
+            <a:schemeClr val="dk1"/>
+          </a:fillRef>
+          <a:effectRef idx="2">
+            <a:schemeClr val="dk1"/>
+          </a:effectRef>
+          <a:fontRef idx="minor">
+            <a:schemeClr val="tx1"/>
+          </a:fontRef>
+        </p:style>
+      </p:cxnSp>
+      <p:cxnSp>
+        <p:nvCxnSpPr>
+          <p:cNvPr id="60" name="Connecteur droit 59">
+            <a:extLst>
+              <a:ext uri="{FF2B5EF4-FFF2-40B4-BE49-F238E27FC236}">
+                <a16:creationId xmlns:a16="http://schemas.microsoft.com/office/drawing/2014/main" id="{CBC9961A-8EC2-4287-A398-BCA4138D409D}"/>
+              </a:ext>
+            </a:extLst>
+          </p:cNvPr>
+          <p:cNvCxnSpPr>
+            <a:cxnSpLocks/>
+          </p:cNvCxnSpPr>
+          <p:nvPr/>
+        </p:nvCxnSpPr>
+        <p:spPr>
+          <a:xfrm>
+            <a:off x="1082434" y="938268"/>
+            <a:ext cx="1146585" cy="0"/>
+          </a:xfrm>
+          <a:prstGeom prst="line">
+            <a:avLst/>
+          </a:prstGeom>
+        </p:spPr>
+        <p:style>
+          <a:lnRef idx="3">
+            <a:schemeClr val="dk1"/>
+          </a:lnRef>
+          <a:fillRef idx="0">
+            <a:schemeClr val="dk1"/>
+          </a:fillRef>
+          <a:effectRef idx="2">
+            <a:schemeClr val="dk1"/>
+          </a:effectRef>
+          <a:fontRef idx="minor">
+            <a:schemeClr val="tx1"/>
+          </a:fontRef>
+        </p:style>
+      </p:cxnSp>
+      <p:cxnSp>
+        <p:nvCxnSpPr>
+          <p:cNvPr id="61" name="Connecteur droit 60">
+            <a:extLst>
+              <a:ext uri="{FF2B5EF4-FFF2-40B4-BE49-F238E27FC236}">
+                <a16:creationId xmlns:a16="http://schemas.microsoft.com/office/drawing/2014/main" id="{152B7C45-2543-4665-BC07-4DB71CA9F337}"/>
+              </a:ext>
+            </a:extLst>
+          </p:cNvPr>
+          <p:cNvCxnSpPr>
+            <a:cxnSpLocks/>
+          </p:cNvCxnSpPr>
+          <p:nvPr/>
+        </p:nvCxnSpPr>
+        <p:spPr>
+          <a:xfrm>
+            <a:off x="9402704" y="465201"/>
+            <a:ext cx="344203" cy="495163"/>
+          </a:xfrm>
+          <a:prstGeom prst="line">
+            <a:avLst/>
+          </a:prstGeom>
+        </p:spPr>
+        <p:style>
+          <a:lnRef idx="3">
+            <a:schemeClr val="dk1"/>
+          </a:lnRef>
+          <a:fillRef idx="0">
+            <a:schemeClr val="dk1"/>
+          </a:fillRef>
+          <a:effectRef idx="2">
+            <a:schemeClr val="dk1"/>
+          </a:effectRef>
+          <a:fontRef idx="minor">
+            <a:schemeClr val="tx1"/>
+          </a:fontRef>
+        </p:style>
+      </p:cxnSp>
+      <p:cxnSp>
+        <p:nvCxnSpPr>
+          <p:cNvPr id="62" name="Connecteur droit 61">
+            <a:extLst>
+              <a:ext uri="{FF2B5EF4-FFF2-40B4-BE49-F238E27FC236}">
+                <a16:creationId xmlns:a16="http://schemas.microsoft.com/office/drawing/2014/main" id="{00A84DC3-A112-46A3-B71C-04D85339323D}"/>
+              </a:ext>
+            </a:extLst>
+          </p:cNvPr>
+          <p:cNvCxnSpPr>
+            <a:cxnSpLocks/>
+          </p:cNvCxnSpPr>
+          <p:nvPr/>
+        </p:nvCxnSpPr>
+        <p:spPr>
+          <a:xfrm flipH="1">
+            <a:off x="11370469" y="448308"/>
+            <a:ext cx="364332" cy="501657"/>
+          </a:xfrm>
+          <a:prstGeom prst="line">
+            <a:avLst/>
+          </a:prstGeom>
+        </p:spPr>
+        <p:style>
+          <a:lnRef idx="3">
+            <a:schemeClr val="dk1"/>
+          </a:lnRef>
+          <a:fillRef idx="0">
+            <a:schemeClr val="dk1"/>
+          </a:fillRef>
+          <a:effectRef idx="2">
+            <a:schemeClr val="dk1"/>
+          </a:effectRef>
+          <a:fontRef idx="minor">
+            <a:schemeClr val="tx1"/>
+          </a:fontRef>
+        </p:style>
+      </p:cxnSp>
+      <p:cxnSp>
+        <p:nvCxnSpPr>
+          <p:cNvPr id="63" name="Connecteur droit 62">
+            <a:extLst>
+              <a:ext uri="{FF2B5EF4-FFF2-40B4-BE49-F238E27FC236}">
+                <a16:creationId xmlns:a16="http://schemas.microsoft.com/office/drawing/2014/main" id="{C50788C6-8F68-44EC-AB54-94C1D2FE554D}"/>
+              </a:ext>
+            </a:extLst>
+          </p:cNvPr>
+          <p:cNvCxnSpPr>
+            <a:cxnSpLocks/>
+          </p:cNvCxnSpPr>
+          <p:nvPr/>
+        </p:nvCxnSpPr>
+        <p:spPr>
+          <a:xfrm>
+            <a:off x="9743203" y="949965"/>
+            <a:ext cx="1627266" cy="0"/>
+          </a:xfrm>
+          <a:prstGeom prst="line">
+            <a:avLst/>
+          </a:prstGeom>
+        </p:spPr>
+        <p:style>
+          <a:lnRef idx="3">
+            <a:schemeClr val="dk1"/>
+          </a:lnRef>
+          <a:fillRef idx="0">
+            <a:schemeClr val="dk1"/>
+          </a:fillRef>
+          <a:effectRef idx="2">
+            <a:schemeClr val="dk1"/>
+          </a:effectRef>
+          <a:fontRef idx="minor">
+            <a:schemeClr val="tx1"/>
+          </a:fontRef>
+        </p:style>
+      </p:cxnSp>
+      <p:cxnSp>
+        <p:nvCxnSpPr>
+          <p:cNvPr id="64" name="Connecteur droit 63">
+            <a:extLst>
+              <a:ext uri="{FF2B5EF4-FFF2-40B4-BE49-F238E27FC236}">
+                <a16:creationId xmlns:a16="http://schemas.microsoft.com/office/drawing/2014/main" id="{BC4D4E5F-5636-45CB-873C-EC085AB307A3}"/>
+              </a:ext>
+            </a:extLst>
+          </p:cNvPr>
+          <p:cNvCxnSpPr>
+            <a:cxnSpLocks/>
+          </p:cNvCxnSpPr>
+          <p:nvPr/>
+        </p:nvCxnSpPr>
+        <p:spPr>
+          <a:xfrm>
+            <a:off x="11715750" y="454801"/>
+            <a:ext cx="476249" cy="10400"/>
+          </a:xfrm>
+          <a:prstGeom prst="line">
+            <a:avLst/>
+          </a:prstGeom>
+        </p:spPr>
+        <p:style>
+          <a:lnRef idx="3">
+            <a:schemeClr val="dk1"/>
+          </a:lnRef>
+          <a:fillRef idx="0">
+            <a:schemeClr val="dk1"/>
+          </a:fillRef>
+          <a:effectRef idx="2">
+            <a:schemeClr val="dk1"/>
+          </a:effectRef>
+          <a:fontRef idx="minor">
+            <a:schemeClr val="tx1"/>
+          </a:fontRef>
+        </p:style>
+      </p:cxnSp>
+      <p:cxnSp>
+        <p:nvCxnSpPr>
+          <p:cNvPr id="65" name="Connecteur droit 64">
+            <a:extLst>
+              <a:ext uri="{FF2B5EF4-FFF2-40B4-BE49-F238E27FC236}">
+                <a16:creationId xmlns:a16="http://schemas.microsoft.com/office/drawing/2014/main" id="{E6F6B4C5-0E3B-46C9-859D-EE774175D36F}"/>
+              </a:ext>
+            </a:extLst>
+          </p:cNvPr>
+          <p:cNvCxnSpPr>
+            <a:cxnSpLocks/>
+          </p:cNvCxnSpPr>
+          <p:nvPr/>
+        </p:nvCxnSpPr>
+        <p:spPr>
+          <a:xfrm flipH="1">
+            <a:off x="2216372" y="446356"/>
+            <a:ext cx="364332" cy="501657"/>
+          </a:xfrm>
+          <a:prstGeom prst="line">
+            <a:avLst/>
+          </a:prstGeom>
+        </p:spPr>
+        <p:style>
+          <a:lnRef idx="3">
+            <a:schemeClr val="dk1"/>
+          </a:lnRef>
+          <a:fillRef idx="0">
+            <a:schemeClr val="dk1"/>
+          </a:fillRef>
+          <a:effectRef idx="2">
+            <a:schemeClr val="dk1"/>
+          </a:effectRef>
+          <a:fontRef idx="minor">
+            <a:schemeClr val="tx1"/>
+          </a:fontRef>
+        </p:style>
+      </p:cxnSp>
+      <p:sp>
+        <p:nvSpPr>
+          <p:cNvPr id="2" name="ZoneTexte 1">
+            <a:extLst>
+              <a:ext uri="{FF2B5EF4-FFF2-40B4-BE49-F238E27FC236}">
+                <a16:creationId xmlns:a16="http://schemas.microsoft.com/office/drawing/2014/main" id="{128A5370-27C5-4A3F-98D7-D74D075851FE}"/>
+              </a:ext>
+            </a:extLst>
+          </p:cNvPr>
+          <p:cNvSpPr txBox="1"/>
+          <p:nvPr/>
+        </p:nvSpPr>
+        <p:spPr>
+          <a:xfrm>
+            <a:off x="3475869" y="523056"/>
+            <a:ext cx="5173181" cy="769441"/>
+          </a:xfrm>
+          <a:prstGeom prst="rect">
+            <a:avLst/>
+          </a:prstGeom>
+          <a:noFill/>
+        </p:spPr>
+        <p:txBody>
+          <a:bodyPr wrap="square" rtlCol="0">
+            <a:spAutoFit/>
+          </a:bodyPr>
+          <a:lstStyle/>
+          <a:p>
+            <a:r>
+              <a:rPr lang="fr-FR" sz="4400" dirty="0">
+                <a:latin typeface="Berlin Sans FB" panose="020E0602020502020306" pitchFamily="34" charset="0"/>
+              </a:rPr>
+              <a:t>Solutions trouvées</a:t>
+            </a:r>
+          </a:p>
+        </p:txBody>
+      </p:sp>
+      <p:pic>
+        <p:nvPicPr>
+          <p:cNvPr id="6" name="Image 5">
+            <a:extLst>
+              <a:ext uri="{FF2B5EF4-FFF2-40B4-BE49-F238E27FC236}">
+                <a16:creationId xmlns:a16="http://schemas.microsoft.com/office/drawing/2014/main" id="{B94F7404-907D-4FE6-89EF-E012ABA7B82B}"/>
+              </a:ext>
+            </a:extLst>
+          </p:cNvPr>
+          <p:cNvPicPr>
+            <a:picLocks noChangeAspect="1"/>
+          </p:cNvPicPr>
+          <p:nvPr/>
+        </p:nvPicPr>
+        <p:blipFill>
+          <a:blip r:embed="rId4">
+            <a:extLst>
+              <a:ext uri="{28A0092B-C50C-407E-A947-70E740481C1C}">
+                <a14:useLocalDpi xmlns:a14="http://schemas.microsoft.com/office/drawing/2010/main" val="0"/>
+              </a:ext>
+            </a:extLst>
+          </a:blip>
+          <a:stretch>
+            <a:fillRect/>
+          </a:stretch>
+        </p:blipFill>
+        <p:spPr>
+          <a:xfrm>
+            <a:off x="3252390" y="1604864"/>
+            <a:ext cx="5163821" cy="5051376"/>
+          </a:xfrm>
+          <a:prstGeom prst="rect">
+            <a:avLst/>
+          </a:prstGeom>
+        </p:spPr>
+      </p:pic>
+    </p:spTree>
+    <p:extLst>
+      <p:ext uri="{BB962C8B-B14F-4D97-AF65-F5344CB8AC3E}">
+        <p14:creationId xmlns:p14="http://schemas.microsoft.com/office/powerpoint/2010/main" val="1458497673"/>
+      </p:ext>
+    </p:extLst>
+  </p:cSld>
+  <p:clrMapOvr>
+    <a:masterClrMapping/>
+  </p:clrMapOvr>
+  <mc:AlternateContent xmlns:mc="http://schemas.openxmlformats.org/markup-compatibility/2006" xmlns:p14="http://schemas.microsoft.com/office/powerpoint/2010/main">
+    <mc:Choice Requires="p14">
+      <p:transition spd="slow">
+        <p14:reveal/>
+      </p:transition>
+    </mc:Choice>
+    <mc:Fallback xmlns="">
+      <p:transition spd="slow">
+        <p:fade/>
+      </p:transition>
+    </mc:Fallback>
+  </mc:AlternateContent>
+</p:sld>
+</file>
+
+<file path=ppt/slides/slide14.xml><?xml version="1.0" encoding="utf-8"?>
 <p:sld xmlns:a="http://schemas.openxmlformats.org/drawingml/2006/main" xmlns:r="http://schemas.openxmlformats.org/officeDocument/2006/relationships" xmlns:p="http://schemas.openxmlformats.org/presentationml/2006/main">
   <p:cSld>
     <p:spTree>
@@ -10887,7 +12626,7 @@
 </p:sld>
 </file>
 
-<file path=ppt/slides/slide13.xml><?xml version="1.0" encoding="utf-8"?>
+<file path=ppt/slides/slide15.xml><?xml version="1.0" encoding="utf-8"?>
 <p:sld xmlns:a="http://schemas.openxmlformats.org/drawingml/2006/main" xmlns:r="http://schemas.openxmlformats.org/officeDocument/2006/relationships" xmlns:p="http://schemas.openxmlformats.org/presentationml/2006/main">
   <p:cSld>
     <p:spTree>
@@ -11658,843 +13397,10 @@
           </a:fontRef>
         </p:style>
       </p:cxnSp>
-      <p:sp>
-        <p:nvSpPr>
-          <p:cNvPr id="2" name="ZoneTexte 1">
-            <a:extLst>
-              <a:ext uri="{FF2B5EF4-FFF2-40B4-BE49-F238E27FC236}">
-                <a16:creationId xmlns:a16="http://schemas.microsoft.com/office/drawing/2014/main" id="{128A5370-27C5-4A3F-98D7-D74D075851FE}"/>
-              </a:ext>
-            </a:extLst>
-          </p:cNvPr>
-          <p:cNvSpPr txBox="1"/>
-          <p:nvPr/>
-        </p:nvSpPr>
-        <p:spPr>
-          <a:xfrm>
-            <a:off x="4569176" y="523056"/>
-            <a:ext cx="2659224" cy="769441"/>
-          </a:xfrm>
-          <a:prstGeom prst="rect">
-            <a:avLst/>
-          </a:prstGeom>
-          <a:noFill/>
-        </p:spPr>
-        <p:txBody>
-          <a:bodyPr wrap="square" rtlCol="0">
-            <a:spAutoFit/>
-          </a:bodyPr>
-          <a:lstStyle/>
-          <a:p>
-            <a:r>
-              <a:rPr lang="fr-FR" sz="4400" dirty="0">
-                <a:latin typeface="Berlin Sans FB" panose="020E0602020502020306" pitchFamily="34" charset="0"/>
-              </a:rPr>
-              <a:t>Conclusion</a:t>
-            </a:r>
-          </a:p>
-        </p:txBody>
-      </p:sp>
     </p:spTree>
     <p:extLst>
       <p:ext uri="{BB962C8B-B14F-4D97-AF65-F5344CB8AC3E}">
-        <p14:creationId xmlns:p14="http://schemas.microsoft.com/office/powerpoint/2010/main" val="1458497673"/>
-      </p:ext>
-    </p:extLst>
-  </p:cSld>
-  <p:clrMapOvr>
-    <a:masterClrMapping/>
-  </p:clrMapOvr>
-  <mc:AlternateContent xmlns:mc="http://schemas.openxmlformats.org/markup-compatibility/2006" xmlns:p14="http://schemas.microsoft.com/office/powerpoint/2010/main">
-    <mc:Choice Requires="p14">
-      <p:transition spd="slow">
-        <p14:reveal/>
-      </p:transition>
-    </mc:Choice>
-    <mc:Fallback xmlns="">
-      <p:transition spd="slow">
-        <p:fade/>
-      </p:transition>
-    </mc:Fallback>
-  </mc:AlternateContent>
-</p:sld>
-</file>
-
-<file path=ppt/slides/slide14.xml><?xml version="1.0" encoding="utf-8"?>
-<p:sld xmlns:a="http://schemas.openxmlformats.org/drawingml/2006/main" xmlns:r="http://schemas.openxmlformats.org/officeDocument/2006/relationships" xmlns:p="http://schemas.openxmlformats.org/presentationml/2006/main">
-  <p:cSld>
-    <p:spTree>
-      <p:nvGrpSpPr>
-        <p:cNvPr id="1" name=""/>
-        <p:cNvGrpSpPr/>
-        <p:nvPr/>
-      </p:nvGrpSpPr>
-      <p:grpSpPr>
-        <a:xfrm>
-          <a:off x="0" y="0"/>
-          <a:ext cx="0" cy="0"/>
-          <a:chOff x="0" y="0"/>
-          <a:chExt cx="0" cy="0"/>
-        </a:xfrm>
-      </p:grpSpPr>
-      <p:pic>
-        <p:nvPicPr>
-          <p:cNvPr id="8" name="Image 7">
-            <a:extLst>
-              <a:ext uri="{FF2B5EF4-FFF2-40B4-BE49-F238E27FC236}">
-                <a16:creationId xmlns:a16="http://schemas.microsoft.com/office/drawing/2014/main" id="{2BB825C5-31DA-4A56-85EA-536DBF510A31}"/>
-              </a:ext>
-            </a:extLst>
-          </p:cNvPr>
-          <p:cNvPicPr>
-            <a:picLocks noChangeAspect="1"/>
-          </p:cNvPicPr>
-          <p:nvPr/>
-        </p:nvPicPr>
-        <p:blipFill>
-          <a:blip r:embed="rId2">
-            <a:extLst>
-              <a:ext uri="{28A0092B-C50C-407E-A947-70E740481C1C}">
-                <a14:useLocalDpi xmlns:a14="http://schemas.microsoft.com/office/drawing/2010/main" val="0"/>
-              </a:ext>
-            </a:extLst>
-          </a:blip>
-          <a:stretch>
-            <a:fillRect/>
-          </a:stretch>
-        </p:blipFill>
-        <p:spPr>
-          <a:xfrm>
-            <a:off x="1068751" y="66457"/>
-            <a:ext cx="1259497" cy="776690"/>
-          </a:xfrm>
-          <a:prstGeom prst="rect">
-            <a:avLst/>
-          </a:prstGeom>
-        </p:spPr>
-      </p:pic>
-      <p:pic>
-        <p:nvPicPr>
-          <p:cNvPr id="10" name="Image 9">
-            <a:extLst>
-              <a:ext uri="{FF2B5EF4-FFF2-40B4-BE49-F238E27FC236}">
-                <a16:creationId xmlns:a16="http://schemas.microsoft.com/office/drawing/2014/main" id="{8EE7436F-49F2-41E0-93E4-D247B4705294}"/>
-              </a:ext>
-            </a:extLst>
-          </p:cNvPr>
-          <p:cNvPicPr>
-            <a:picLocks noChangeAspect="1"/>
-          </p:cNvPicPr>
-          <p:nvPr/>
-        </p:nvPicPr>
-        <p:blipFill>
-          <a:blip r:embed="rId3">
-            <a:extLst>
-              <a:ext uri="{28A0092B-C50C-407E-A947-70E740481C1C}">
-                <a14:useLocalDpi xmlns:a14="http://schemas.microsoft.com/office/drawing/2010/main" val="0"/>
-              </a:ext>
-            </a:extLst>
-          </a:blip>
-          <a:stretch>
-            <a:fillRect/>
-          </a:stretch>
-        </p:blipFill>
-        <p:spPr>
-          <a:xfrm>
-            <a:off x="9681085" y="238153"/>
-            <a:ext cx="1802101" cy="569807"/>
-          </a:xfrm>
-          <a:prstGeom prst="rect">
-            <a:avLst/>
-          </a:prstGeom>
-        </p:spPr>
-      </p:pic>
-      <p:cxnSp>
-        <p:nvCxnSpPr>
-          <p:cNvPr id="16" name="Connecteur droit 15">
-            <a:extLst>
-              <a:ext uri="{FF2B5EF4-FFF2-40B4-BE49-F238E27FC236}">
-                <a16:creationId xmlns:a16="http://schemas.microsoft.com/office/drawing/2014/main" id="{7319284A-BD6F-4A96-8E2B-E0A4B52E53C6}"/>
-              </a:ext>
-            </a:extLst>
-          </p:cNvPr>
-          <p:cNvCxnSpPr>
-            <a:cxnSpLocks/>
-          </p:cNvCxnSpPr>
-          <p:nvPr/>
-        </p:nvCxnSpPr>
-        <p:spPr>
-          <a:xfrm flipV="1">
-            <a:off x="0" y="454803"/>
-            <a:ext cx="738231" cy="1798"/>
-          </a:xfrm>
-          <a:prstGeom prst="line">
-            <a:avLst/>
-          </a:prstGeom>
-        </p:spPr>
-        <p:style>
-          <a:lnRef idx="3">
-            <a:schemeClr val="dk1"/>
-          </a:lnRef>
-          <a:fillRef idx="0">
-            <a:schemeClr val="dk1"/>
-          </a:fillRef>
-          <a:effectRef idx="2">
-            <a:schemeClr val="dk1"/>
-          </a:effectRef>
-          <a:fontRef idx="minor">
-            <a:schemeClr val="tx1"/>
-          </a:fontRef>
-        </p:style>
-      </p:cxnSp>
-      <p:cxnSp>
-        <p:nvCxnSpPr>
-          <p:cNvPr id="20" name="Connecteur droit 19">
-            <a:extLst>
-              <a:ext uri="{FF2B5EF4-FFF2-40B4-BE49-F238E27FC236}">
-                <a16:creationId xmlns:a16="http://schemas.microsoft.com/office/drawing/2014/main" id="{08874CF7-F149-4C81-B61E-74E18342BA8A}"/>
-              </a:ext>
-            </a:extLst>
-          </p:cNvPr>
-          <p:cNvCxnSpPr>
-            <a:cxnSpLocks/>
-          </p:cNvCxnSpPr>
-          <p:nvPr/>
-        </p:nvCxnSpPr>
-        <p:spPr>
-          <a:xfrm>
-            <a:off x="2573222" y="454803"/>
-            <a:ext cx="6829482" cy="10398"/>
-          </a:xfrm>
-          <a:prstGeom prst="line">
-            <a:avLst/>
-          </a:prstGeom>
-        </p:spPr>
-        <p:style>
-          <a:lnRef idx="3">
-            <a:schemeClr val="dk1"/>
-          </a:lnRef>
-          <a:fillRef idx="0">
-            <a:schemeClr val="dk1"/>
-          </a:fillRef>
-          <a:effectRef idx="2">
-            <a:schemeClr val="dk1"/>
-          </a:effectRef>
-          <a:fontRef idx="minor">
-            <a:schemeClr val="tx1"/>
-          </a:fontRef>
-        </p:style>
-      </p:cxnSp>
-      <p:cxnSp>
-        <p:nvCxnSpPr>
-          <p:cNvPr id="26" name="Connecteur droit 25">
-            <a:extLst>
-              <a:ext uri="{FF2B5EF4-FFF2-40B4-BE49-F238E27FC236}">
-                <a16:creationId xmlns:a16="http://schemas.microsoft.com/office/drawing/2014/main" id="{BB3B35CC-057B-48C1-880F-3306A6559175}"/>
-              </a:ext>
-            </a:extLst>
-          </p:cNvPr>
-          <p:cNvCxnSpPr>
-            <a:cxnSpLocks/>
-          </p:cNvCxnSpPr>
-          <p:nvPr/>
-        </p:nvCxnSpPr>
-        <p:spPr>
-          <a:xfrm>
-            <a:off x="738231" y="454803"/>
-            <a:ext cx="344203" cy="484764"/>
-          </a:xfrm>
-          <a:prstGeom prst="line">
-            <a:avLst/>
-          </a:prstGeom>
-        </p:spPr>
-        <p:style>
-          <a:lnRef idx="3">
-            <a:schemeClr val="dk1"/>
-          </a:lnRef>
-          <a:fillRef idx="0">
-            <a:schemeClr val="dk1"/>
-          </a:fillRef>
-          <a:effectRef idx="2">
-            <a:schemeClr val="dk1"/>
-          </a:effectRef>
-          <a:fontRef idx="minor">
-            <a:schemeClr val="tx1"/>
-          </a:fontRef>
-        </p:style>
-      </p:cxnSp>
-      <p:cxnSp>
-        <p:nvCxnSpPr>
-          <p:cNvPr id="32" name="Connecteur droit 31">
-            <a:extLst>
-              <a:ext uri="{FF2B5EF4-FFF2-40B4-BE49-F238E27FC236}">
-                <a16:creationId xmlns:a16="http://schemas.microsoft.com/office/drawing/2014/main" id="{4AD96496-1EB6-4E48-9BB2-5C255495C686}"/>
-              </a:ext>
-            </a:extLst>
-          </p:cNvPr>
-          <p:cNvCxnSpPr>
-            <a:cxnSpLocks/>
-          </p:cNvCxnSpPr>
-          <p:nvPr/>
-        </p:nvCxnSpPr>
-        <p:spPr>
-          <a:xfrm>
-            <a:off x="1082434" y="938268"/>
-            <a:ext cx="1146585" cy="0"/>
-          </a:xfrm>
-          <a:prstGeom prst="line">
-            <a:avLst/>
-          </a:prstGeom>
-        </p:spPr>
-        <p:style>
-          <a:lnRef idx="3">
-            <a:schemeClr val="dk1"/>
-          </a:lnRef>
-          <a:fillRef idx="0">
-            <a:schemeClr val="dk1"/>
-          </a:fillRef>
-          <a:effectRef idx="2">
-            <a:schemeClr val="dk1"/>
-          </a:effectRef>
-          <a:fontRef idx="minor">
-            <a:schemeClr val="tx1"/>
-          </a:fontRef>
-        </p:style>
-      </p:cxnSp>
-      <p:cxnSp>
-        <p:nvCxnSpPr>
-          <p:cNvPr id="51" name="Connecteur droit 50">
-            <a:extLst>
-              <a:ext uri="{FF2B5EF4-FFF2-40B4-BE49-F238E27FC236}">
-                <a16:creationId xmlns:a16="http://schemas.microsoft.com/office/drawing/2014/main" id="{C035BFA6-ECBF-4775-BA81-19D2CA41AA8D}"/>
-              </a:ext>
-            </a:extLst>
-          </p:cNvPr>
-          <p:cNvCxnSpPr>
-            <a:cxnSpLocks/>
-          </p:cNvCxnSpPr>
-          <p:nvPr/>
-        </p:nvCxnSpPr>
-        <p:spPr>
-          <a:xfrm>
-            <a:off x="9402704" y="465201"/>
-            <a:ext cx="344203" cy="495163"/>
-          </a:xfrm>
-          <a:prstGeom prst="line">
-            <a:avLst/>
-          </a:prstGeom>
-        </p:spPr>
-        <p:style>
-          <a:lnRef idx="3">
-            <a:schemeClr val="dk1"/>
-          </a:lnRef>
-          <a:fillRef idx="0">
-            <a:schemeClr val="dk1"/>
-          </a:fillRef>
-          <a:effectRef idx="2">
-            <a:schemeClr val="dk1"/>
-          </a:effectRef>
-          <a:fontRef idx="minor">
-            <a:schemeClr val="tx1"/>
-          </a:fontRef>
-        </p:style>
-      </p:cxnSp>
-      <p:cxnSp>
-        <p:nvCxnSpPr>
-          <p:cNvPr id="52" name="Connecteur droit 51">
-            <a:extLst>
-              <a:ext uri="{FF2B5EF4-FFF2-40B4-BE49-F238E27FC236}">
-                <a16:creationId xmlns:a16="http://schemas.microsoft.com/office/drawing/2014/main" id="{FA310BC7-694B-4984-99A2-61A1F4F6EBF9}"/>
-              </a:ext>
-            </a:extLst>
-          </p:cNvPr>
-          <p:cNvCxnSpPr>
-            <a:cxnSpLocks/>
-          </p:cNvCxnSpPr>
-          <p:nvPr/>
-        </p:nvCxnSpPr>
-        <p:spPr>
-          <a:xfrm flipH="1">
-            <a:off x="11370469" y="448308"/>
-            <a:ext cx="364332" cy="501657"/>
-          </a:xfrm>
-          <a:prstGeom prst="line">
-            <a:avLst/>
-          </a:prstGeom>
-        </p:spPr>
-        <p:style>
-          <a:lnRef idx="3">
-            <a:schemeClr val="dk1"/>
-          </a:lnRef>
-          <a:fillRef idx="0">
-            <a:schemeClr val="dk1"/>
-          </a:fillRef>
-          <a:effectRef idx="2">
-            <a:schemeClr val="dk1"/>
-          </a:effectRef>
-          <a:fontRef idx="minor">
-            <a:schemeClr val="tx1"/>
-          </a:fontRef>
-        </p:style>
-      </p:cxnSp>
-      <p:cxnSp>
-        <p:nvCxnSpPr>
-          <p:cNvPr id="53" name="Connecteur droit 52">
-            <a:extLst>
-              <a:ext uri="{FF2B5EF4-FFF2-40B4-BE49-F238E27FC236}">
-                <a16:creationId xmlns:a16="http://schemas.microsoft.com/office/drawing/2014/main" id="{BE0649BD-EE59-4DDA-960F-95B2572F9F13}"/>
-              </a:ext>
-            </a:extLst>
-          </p:cNvPr>
-          <p:cNvCxnSpPr>
-            <a:cxnSpLocks/>
-          </p:cNvCxnSpPr>
-          <p:nvPr/>
-        </p:nvCxnSpPr>
-        <p:spPr>
-          <a:xfrm>
-            <a:off x="9743203" y="949965"/>
-            <a:ext cx="1627266" cy="0"/>
-          </a:xfrm>
-          <a:prstGeom prst="line">
-            <a:avLst/>
-          </a:prstGeom>
-        </p:spPr>
-        <p:style>
-          <a:lnRef idx="3">
-            <a:schemeClr val="dk1"/>
-          </a:lnRef>
-          <a:fillRef idx="0">
-            <a:schemeClr val="dk1"/>
-          </a:fillRef>
-          <a:effectRef idx="2">
-            <a:schemeClr val="dk1"/>
-          </a:effectRef>
-          <a:fontRef idx="minor">
-            <a:schemeClr val="tx1"/>
-          </a:fontRef>
-        </p:style>
-      </p:cxnSp>
-      <p:cxnSp>
-        <p:nvCxnSpPr>
-          <p:cNvPr id="55" name="Connecteur droit 54">
-            <a:extLst>
-              <a:ext uri="{FF2B5EF4-FFF2-40B4-BE49-F238E27FC236}">
-                <a16:creationId xmlns:a16="http://schemas.microsoft.com/office/drawing/2014/main" id="{52AA9200-DAFA-4EEF-AC13-4C7CE82A59EC}"/>
-              </a:ext>
-            </a:extLst>
-          </p:cNvPr>
-          <p:cNvCxnSpPr>
-            <a:cxnSpLocks/>
-          </p:cNvCxnSpPr>
-          <p:nvPr/>
-        </p:nvCxnSpPr>
-        <p:spPr>
-          <a:xfrm>
-            <a:off x="11715750" y="454801"/>
-            <a:ext cx="476249" cy="10400"/>
-          </a:xfrm>
-          <a:prstGeom prst="line">
-            <a:avLst/>
-          </a:prstGeom>
-        </p:spPr>
-        <p:style>
-          <a:lnRef idx="3">
-            <a:schemeClr val="dk1"/>
-          </a:lnRef>
-          <a:fillRef idx="0">
-            <a:schemeClr val="dk1"/>
-          </a:fillRef>
-          <a:effectRef idx="2">
-            <a:schemeClr val="dk1"/>
-          </a:effectRef>
-          <a:fontRef idx="minor">
-            <a:schemeClr val="tx1"/>
-          </a:fontRef>
-        </p:style>
-      </p:cxnSp>
-      <p:cxnSp>
-        <p:nvCxnSpPr>
-          <p:cNvPr id="23" name="Connecteur droit 22">
-            <a:extLst>
-              <a:ext uri="{FF2B5EF4-FFF2-40B4-BE49-F238E27FC236}">
-                <a16:creationId xmlns:a16="http://schemas.microsoft.com/office/drawing/2014/main" id="{BCB092C8-0080-4E56-957E-0046D4C83988}"/>
-              </a:ext>
-            </a:extLst>
-          </p:cNvPr>
-          <p:cNvCxnSpPr>
-            <a:cxnSpLocks/>
-          </p:cNvCxnSpPr>
-          <p:nvPr/>
-        </p:nvCxnSpPr>
-        <p:spPr>
-          <a:xfrm flipH="1">
-            <a:off x="2216372" y="446356"/>
-            <a:ext cx="364332" cy="501657"/>
-          </a:xfrm>
-          <a:prstGeom prst="line">
-            <a:avLst/>
-          </a:prstGeom>
-        </p:spPr>
-        <p:style>
-          <a:lnRef idx="3">
-            <a:schemeClr val="dk1"/>
-          </a:lnRef>
-          <a:fillRef idx="0">
-            <a:schemeClr val="dk1"/>
-          </a:fillRef>
-          <a:effectRef idx="2">
-            <a:schemeClr val="dk1"/>
-          </a:effectRef>
-          <a:fontRef idx="minor">
-            <a:schemeClr val="tx1"/>
-          </a:fontRef>
-        </p:style>
-      </p:cxnSp>
-      <p:pic>
-        <p:nvPicPr>
-          <p:cNvPr id="57" name="Image 56">
-            <a:extLst>
-              <a:ext uri="{FF2B5EF4-FFF2-40B4-BE49-F238E27FC236}">
-                <a16:creationId xmlns:a16="http://schemas.microsoft.com/office/drawing/2014/main" id="{12B16FB2-5844-4B92-AE69-9BAC858C22BB}"/>
-              </a:ext>
-            </a:extLst>
-          </p:cNvPr>
-          <p:cNvPicPr>
-            <a:picLocks noChangeAspect="1"/>
-          </p:cNvPicPr>
-          <p:nvPr/>
-        </p:nvPicPr>
-        <p:blipFill>
-          <a:blip r:embed="rId3">
-            <a:extLst>
-              <a:ext uri="{28A0092B-C50C-407E-A947-70E740481C1C}">
-                <a14:useLocalDpi xmlns:a14="http://schemas.microsoft.com/office/drawing/2010/main" val="0"/>
-              </a:ext>
-            </a:extLst>
-          </a:blip>
-          <a:stretch>
-            <a:fillRect/>
-          </a:stretch>
-        </p:blipFill>
-        <p:spPr>
-          <a:xfrm>
-            <a:off x="9681085" y="238153"/>
-            <a:ext cx="1802101" cy="569807"/>
-          </a:xfrm>
-          <a:prstGeom prst="rect">
-            <a:avLst/>
-          </a:prstGeom>
-        </p:spPr>
-      </p:pic>
-      <p:cxnSp>
-        <p:nvCxnSpPr>
-          <p:cNvPr id="58" name="Connecteur droit 57">
-            <a:extLst>
-              <a:ext uri="{FF2B5EF4-FFF2-40B4-BE49-F238E27FC236}">
-                <a16:creationId xmlns:a16="http://schemas.microsoft.com/office/drawing/2014/main" id="{01599350-F8B0-4FDC-B003-981189A8D654}"/>
-              </a:ext>
-            </a:extLst>
-          </p:cNvPr>
-          <p:cNvCxnSpPr>
-            <a:cxnSpLocks/>
-          </p:cNvCxnSpPr>
-          <p:nvPr/>
-        </p:nvCxnSpPr>
-        <p:spPr>
-          <a:xfrm>
-            <a:off x="2573222" y="454803"/>
-            <a:ext cx="6829482" cy="10398"/>
-          </a:xfrm>
-          <a:prstGeom prst="line">
-            <a:avLst/>
-          </a:prstGeom>
-        </p:spPr>
-        <p:style>
-          <a:lnRef idx="3">
-            <a:schemeClr val="dk1"/>
-          </a:lnRef>
-          <a:fillRef idx="0">
-            <a:schemeClr val="dk1"/>
-          </a:fillRef>
-          <a:effectRef idx="2">
-            <a:schemeClr val="dk1"/>
-          </a:effectRef>
-          <a:fontRef idx="minor">
-            <a:schemeClr val="tx1"/>
-          </a:fontRef>
-        </p:style>
-      </p:cxnSp>
-      <p:cxnSp>
-        <p:nvCxnSpPr>
-          <p:cNvPr id="59" name="Connecteur droit 58">
-            <a:extLst>
-              <a:ext uri="{FF2B5EF4-FFF2-40B4-BE49-F238E27FC236}">
-                <a16:creationId xmlns:a16="http://schemas.microsoft.com/office/drawing/2014/main" id="{BC6E6150-6054-4785-84EC-0C46D82034C2}"/>
-              </a:ext>
-            </a:extLst>
-          </p:cNvPr>
-          <p:cNvCxnSpPr>
-            <a:cxnSpLocks/>
-          </p:cNvCxnSpPr>
-          <p:nvPr/>
-        </p:nvCxnSpPr>
-        <p:spPr>
-          <a:xfrm>
-            <a:off x="738231" y="454803"/>
-            <a:ext cx="344203" cy="484764"/>
-          </a:xfrm>
-          <a:prstGeom prst="line">
-            <a:avLst/>
-          </a:prstGeom>
-        </p:spPr>
-        <p:style>
-          <a:lnRef idx="3">
-            <a:schemeClr val="dk1"/>
-          </a:lnRef>
-          <a:fillRef idx="0">
-            <a:schemeClr val="dk1"/>
-          </a:fillRef>
-          <a:effectRef idx="2">
-            <a:schemeClr val="dk1"/>
-          </a:effectRef>
-          <a:fontRef idx="minor">
-            <a:schemeClr val="tx1"/>
-          </a:fontRef>
-        </p:style>
-      </p:cxnSp>
-      <p:cxnSp>
-        <p:nvCxnSpPr>
-          <p:cNvPr id="60" name="Connecteur droit 59">
-            <a:extLst>
-              <a:ext uri="{FF2B5EF4-FFF2-40B4-BE49-F238E27FC236}">
-                <a16:creationId xmlns:a16="http://schemas.microsoft.com/office/drawing/2014/main" id="{CBC9961A-8EC2-4287-A398-BCA4138D409D}"/>
-              </a:ext>
-            </a:extLst>
-          </p:cNvPr>
-          <p:cNvCxnSpPr>
-            <a:cxnSpLocks/>
-          </p:cNvCxnSpPr>
-          <p:nvPr/>
-        </p:nvCxnSpPr>
-        <p:spPr>
-          <a:xfrm>
-            <a:off x="1082434" y="938268"/>
-            <a:ext cx="1146585" cy="0"/>
-          </a:xfrm>
-          <a:prstGeom prst="line">
-            <a:avLst/>
-          </a:prstGeom>
-        </p:spPr>
-        <p:style>
-          <a:lnRef idx="3">
-            <a:schemeClr val="dk1"/>
-          </a:lnRef>
-          <a:fillRef idx="0">
-            <a:schemeClr val="dk1"/>
-          </a:fillRef>
-          <a:effectRef idx="2">
-            <a:schemeClr val="dk1"/>
-          </a:effectRef>
-          <a:fontRef idx="minor">
-            <a:schemeClr val="tx1"/>
-          </a:fontRef>
-        </p:style>
-      </p:cxnSp>
-      <p:cxnSp>
-        <p:nvCxnSpPr>
-          <p:cNvPr id="61" name="Connecteur droit 60">
-            <a:extLst>
-              <a:ext uri="{FF2B5EF4-FFF2-40B4-BE49-F238E27FC236}">
-                <a16:creationId xmlns:a16="http://schemas.microsoft.com/office/drawing/2014/main" id="{152B7C45-2543-4665-BC07-4DB71CA9F337}"/>
-              </a:ext>
-            </a:extLst>
-          </p:cNvPr>
-          <p:cNvCxnSpPr>
-            <a:cxnSpLocks/>
-          </p:cNvCxnSpPr>
-          <p:nvPr/>
-        </p:nvCxnSpPr>
-        <p:spPr>
-          <a:xfrm>
-            <a:off x="9402704" y="465201"/>
-            <a:ext cx="344203" cy="495163"/>
-          </a:xfrm>
-          <a:prstGeom prst="line">
-            <a:avLst/>
-          </a:prstGeom>
-        </p:spPr>
-        <p:style>
-          <a:lnRef idx="3">
-            <a:schemeClr val="dk1"/>
-          </a:lnRef>
-          <a:fillRef idx="0">
-            <a:schemeClr val="dk1"/>
-          </a:fillRef>
-          <a:effectRef idx="2">
-            <a:schemeClr val="dk1"/>
-          </a:effectRef>
-          <a:fontRef idx="minor">
-            <a:schemeClr val="tx1"/>
-          </a:fontRef>
-        </p:style>
-      </p:cxnSp>
-      <p:cxnSp>
-        <p:nvCxnSpPr>
-          <p:cNvPr id="62" name="Connecteur droit 61">
-            <a:extLst>
-              <a:ext uri="{FF2B5EF4-FFF2-40B4-BE49-F238E27FC236}">
-                <a16:creationId xmlns:a16="http://schemas.microsoft.com/office/drawing/2014/main" id="{00A84DC3-A112-46A3-B71C-04D85339323D}"/>
-              </a:ext>
-            </a:extLst>
-          </p:cNvPr>
-          <p:cNvCxnSpPr>
-            <a:cxnSpLocks/>
-          </p:cNvCxnSpPr>
-          <p:nvPr/>
-        </p:nvCxnSpPr>
-        <p:spPr>
-          <a:xfrm flipH="1">
-            <a:off x="11370469" y="448308"/>
-            <a:ext cx="364332" cy="501657"/>
-          </a:xfrm>
-          <a:prstGeom prst="line">
-            <a:avLst/>
-          </a:prstGeom>
-        </p:spPr>
-        <p:style>
-          <a:lnRef idx="3">
-            <a:schemeClr val="dk1"/>
-          </a:lnRef>
-          <a:fillRef idx="0">
-            <a:schemeClr val="dk1"/>
-          </a:fillRef>
-          <a:effectRef idx="2">
-            <a:schemeClr val="dk1"/>
-          </a:effectRef>
-          <a:fontRef idx="minor">
-            <a:schemeClr val="tx1"/>
-          </a:fontRef>
-        </p:style>
-      </p:cxnSp>
-      <p:cxnSp>
-        <p:nvCxnSpPr>
-          <p:cNvPr id="63" name="Connecteur droit 62">
-            <a:extLst>
-              <a:ext uri="{FF2B5EF4-FFF2-40B4-BE49-F238E27FC236}">
-                <a16:creationId xmlns:a16="http://schemas.microsoft.com/office/drawing/2014/main" id="{C50788C6-8F68-44EC-AB54-94C1D2FE554D}"/>
-              </a:ext>
-            </a:extLst>
-          </p:cNvPr>
-          <p:cNvCxnSpPr>
-            <a:cxnSpLocks/>
-          </p:cNvCxnSpPr>
-          <p:nvPr/>
-        </p:nvCxnSpPr>
-        <p:spPr>
-          <a:xfrm>
-            <a:off x="9743203" y="949965"/>
-            <a:ext cx="1627266" cy="0"/>
-          </a:xfrm>
-          <a:prstGeom prst="line">
-            <a:avLst/>
-          </a:prstGeom>
-        </p:spPr>
-        <p:style>
-          <a:lnRef idx="3">
-            <a:schemeClr val="dk1"/>
-          </a:lnRef>
-          <a:fillRef idx="0">
-            <a:schemeClr val="dk1"/>
-          </a:fillRef>
-          <a:effectRef idx="2">
-            <a:schemeClr val="dk1"/>
-          </a:effectRef>
-          <a:fontRef idx="minor">
-            <a:schemeClr val="tx1"/>
-          </a:fontRef>
-        </p:style>
-      </p:cxnSp>
-      <p:cxnSp>
-        <p:nvCxnSpPr>
-          <p:cNvPr id="64" name="Connecteur droit 63">
-            <a:extLst>
-              <a:ext uri="{FF2B5EF4-FFF2-40B4-BE49-F238E27FC236}">
-                <a16:creationId xmlns:a16="http://schemas.microsoft.com/office/drawing/2014/main" id="{BC4D4E5F-5636-45CB-873C-EC085AB307A3}"/>
-              </a:ext>
-            </a:extLst>
-          </p:cNvPr>
-          <p:cNvCxnSpPr>
-            <a:cxnSpLocks/>
-          </p:cNvCxnSpPr>
-          <p:nvPr/>
-        </p:nvCxnSpPr>
-        <p:spPr>
-          <a:xfrm>
-            <a:off x="11715750" y="454801"/>
-            <a:ext cx="476249" cy="10400"/>
-          </a:xfrm>
-          <a:prstGeom prst="line">
-            <a:avLst/>
-          </a:prstGeom>
-        </p:spPr>
-        <p:style>
-          <a:lnRef idx="3">
-            <a:schemeClr val="dk1"/>
-          </a:lnRef>
-          <a:fillRef idx="0">
-            <a:schemeClr val="dk1"/>
-          </a:fillRef>
-          <a:effectRef idx="2">
-            <a:schemeClr val="dk1"/>
-          </a:effectRef>
-          <a:fontRef idx="minor">
-            <a:schemeClr val="tx1"/>
-          </a:fontRef>
-        </p:style>
-      </p:cxnSp>
-      <p:cxnSp>
-        <p:nvCxnSpPr>
-          <p:cNvPr id="65" name="Connecteur droit 64">
-            <a:extLst>
-              <a:ext uri="{FF2B5EF4-FFF2-40B4-BE49-F238E27FC236}">
-                <a16:creationId xmlns:a16="http://schemas.microsoft.com/office/drawing/2014/main" id="{E6F6B4C5-0E3B-46C9-859D-EE774175D36F}"/>
-              </a:ext>
-            </a:extLst>
-          </p:cNvPr>
-          <p:cNvCxnSpPr>
-            <a:cxnSpLocks/>
-          </p:cNvCxnSpPr>
-          <p:nvPr/>
-        </p:nvCxnSpPr>
-        <p:spPr>
-          <a:xfrm flipH="1">
-            <a:off x="2216372" y="446356"/>
-            <a:ext cx="364332" cy="501657"/>
-          </a:xfrm>
-          <a:prstGeom prst="line">
-            <a:avLst/>
-          </a:prstGeom>
-        </p:spPr>
-        <p:style>
-          <a:lnRef idx="3">
-            <a:schemeClr val="dk1"/>
-          </a:lnRef>
-          <a:fillRef idx="0">
-            <a:schemeClr val="dk1"/>
-          </a:fillRef>
-          <a:effectRef idx="2">
-            <a:schemeClr val="dk1"/>
-          </a:effectRef>
-          <a:fontRef idx="minor">
-            <a:schemeClr val="tx1"/>
-          </a:fontRef>
-        </p:style>
-      </p:cxnSp>
-    </p:spTree>
-    <p:extLst>
-      <p:ext uri="{BB962C8B-B14F-4D97-AF65-F5344CB8AC3E}">
-        <p14:creationId xmlns:p14="http://schemas.microsoft.com/office/powerpoint/2010/main" val="113769124"/>
+        <p14:creationId xmlns:p14="http://schemas.microsoft.com/office/powerpoint/2010/main" val="823890658"/>
       </p:ext>
     </p:extLst>
   </p:cSld>
@@ -22577,48 +23483,12 @@
           </a:fontRef>
         </p:style>
       </p:cxnSp>
-      <p:pic>
-        <p:nvPicPr>
-          <p:cNvPr id="24" name="Image 23">
-            <a:extLst>
-              <a:ext uri="{FF2B5EF4-FFF2-40B4-BE49-F238E27FC236}">
-                <a16:creationId xmlns:a16="http://schemas.microsoft.com/office/drawing/2014/main" id="{7A11CD42-93A2-4CE9-8917-661C6FDC8EB2}"/>
-              </a:ext>
-            </a:extLst>
-          </p:cNvPr>
-          <p:cNvPicPr>
-            <a:picLocks noChangeAspect="1"/>
-          </p:cNvPicPr>
-          <p:nvPr/>
-        </p:nvPicPr>
-        <p:blipFill>
-          <a:blip r:embed="rId4">
-            <a:extLst>
-              <a:ext uri="{28A0092B-C50C-407E-A947-70E740481C1C}">
-                <a14:useLocalDpi xmlns:a14="http://schemas.microsoft.com/office/drawing/2010/main" val="0"/>
-              </a:ext>
-            </a:extLst>
-          </a:blip>
-          <a:stretch>
-            <a:fillRect/>
-          </a:stretch>
-        </p:blipFill>
-        <p:spPr>
-          <a:xfrm>
-            <a:off x="1655727" y="2046914"/>
-            <a:ext cx="7028292" cy="4777614"/>
-          </a:xfrm>
-          <a:prstGeom prst="rect">
-            <a:avLst/>
-          </a:prstGeom>
-        </p:spPr>
-      </p:pic>
       <p:sp>
         <p:nvSpPr>
-          <p:cNvPr id="4" name="ZoneTexte 3">
-            <a:extLst>
-              <a:ext uri="{FF2B5EF4-FFF2-40B4-BE49-F238E27FC236}">
-                <a16:creationId xmlns:a16="http://schemas.microsoft.com/office/drawing/2014/main" id="{E77BD0C0-B104-436D-A198-D80CD647A659}"/>
+          <p:cNvPr id="2" name="ZoneTexte 1">
+            <a:extLst>
+              <a:ext uri="{FF2B5EF4-FFF2-40B4-BE49-F238E27FC236}">
+                <a16:creationId xmlns:a16="http://schemas.microsoft.com/office/drawing/2014/main" id="{DB534AD8-D034-4235-A7A8-29760A5AAC15}"/>
               </a:ext>
             </a:extLst>
           </p:cNvPr>
@@ -22627,8 +23497,8 @@
         </p:nvSpPr>
         <p:spPr>
           <a:xfrm>
-            <a:off x="2988527" y="691412"/>
-            <a:ext cx="6243927" cy="1446550"/>
+            <a:off x="3246498" y="523056"/>
+            <a:ext cx="5212031" cy="769441"/>
           </a:xfrm>
           <a:prstGeom prst="rect">
             <a:avLst/>
@@ -22645,15 +23515,449 @@
               <a:rPr lang="fr-FR" sz="4400" dirty="0">
                 <a:latin typeface="Berlin Sans FB" panose="020E0602020502020306" pitchFamily="34" charset="0"/>
               </a:rPr>
-              <a:t>Diagramme de cas d’utilisation</a:t>
+              <a:t>Partie Personnelle</a:t>
             </a:r>
           </a:p>
         </p:txBody>
       </p:sp>
+      <p:sp>
+        <p:nvSpPr>
+          <p:cNvPr id="3" name="ZoneTexte 2">
+            <a:extLst>
+              <a:ext uri="{FF2B5EF4-FFF2-40B4-BE49-F238E27FC236}">
+                <a16:creationId xmlns:a16="http://schemas.microsoft.com/office/drawing/2014/main" id="{944C3CE7-CCC3-40E1-988F-1C2A087D5740}"/>
+              </a:ext>
+            </a:extLst>
+          </p:cNvPr>
+          <p:cNvSpPr txBox="1"/>
+          <p:nvPr/>
+        </p:nvSpPr>
+        <p:spPr>
+          <a:xfrm>
+            <a:off x="595617" y="2038525"/>
+            <a:ext cx="3649211" cy="369332"/>
+          </a:xfrm>
+          <a:prstGeom prst="rect">
+            <a:avLst/>
+          </a:prstGeom>
+          <a:noFill/>
+        </p:spPr>
+        <p:txBody>
+          <a:bodyPr wrap="square" rtlCol="0">
+            <a:spAutoFit/>
+          </a:bodyPr>
+          <a:lstStyle/>
+          <a:p>
+            <a:r>
+              <a:rPr lang="fr-FR" dirty="0"/>
+              <a:t>Acquisition de la direction du vent </a:t>
+            </a:r>
+          </a:p>
+        </p:txBody>
+      </p:sp>
+      <p:sp>
+        <p:nvSpPr>
+          <p:cNvPr id="4" name="ZoneTexte 3">
+            <a:extLst>
+              <a:ext uri="{FF2B5EF4-FFF2-40B4-BE49-F238E27FC236}">
+                <a16:creationId xmlns:a16="http://schemas.microsoft.com/office/drawing/2014/main" id="{DDAEABC3-9880-4D14-B8AC-13A5A0095B87}"/>
+              </a:ext>
+            </a:extLst>
+          </p:cNvPr>
+          <p:cNvSpPr txBox="1"/>
+          <p:nvPr/>
+        </p:nvSpPr>
+        <p:spPr>
+          <a:xfrm>
+            <a:off x="621088" y="2830719"/>
+            <a:ext cx="3103927" cy="646331"/>
+          </a:xfrm>
+          <a:prstGeom prst="rect">
+            <a:avLst/>
+          </a:prstGeom>
+          <a:noFill/>
+        </p:spPr>
+        <p:txBody>
+          <a:bodyPr wrap="square" rtlCol="0">
+            <a:spAutoFit/>
+          </a:bodyPr>
+          <a:lstStyle/>
+          <a:p>
+            <a:r>
+              <a:rPr lang="fr-FR" dirty="0"/>
+              <a:t>Acquisition de la force du vent </a:t>
+            </a:r>
+          </a:p>
+          <a:p>
+            <a:endParaRPr lang="fr-FR" dirty="0"/>
+          </a:p>
+        </p:txBody>
+      </p:sp>
+      <p:sp>
+        <p:nvSpPr>
+          <p:cNvPr id="9" name="ZoneTexte 8">
+            <a:extLst>
+              <a:ext uri="{FF2B5EF4-FFF2-40B4-BE49-F238E27FC236}">
+                <a16:creationId xmlns:a16="http://schemas.microsoft.com/office/drawing/2014/main" id="{694162A9-B416-4F26-8727-7313474787A2}"/>
+              </a:ext>
+            </a:extLst>
+          </p:cNvPr>
+          <p:cNvSpPr txBox="1"/>
+          <p:nvPr/>
+        </p:nvSpPr>
+        <p:spPr>
+          <a:xfrm>
+            <a:off x="621088" y="3707934"/>
+            <a:ext cx="3414319" cy="369332"/>
+          </a:xfrm>
+          <a:prstGeom prst="rect">
+            <a:avLst/>
+          </a:prstGeom>
+          <a:noFill/>
+        </p:spPr>
+        <p:txBody>
+          <a:bodyPr wrap="square" rtlCol="0">
+            <a:spAutoFit/>
+          </a:bodyPr>
+          <a:lstStyle/>
+          <a:p>
+            <a:r>
+              <a:rPr lang="fr-FR" dirty="0"/>
+              <a:t>Définir la périodicité des mesures</a:t>
+            </a:r>
+          </a:p>
+        </p:txBody>
+      </p:sp>
+      <p:sp>
+        <p:nvSpPr>
+          <p:cNvPr id="11" name="ZoneTexte 10">
+            <a:extLst>
+              <a:ext uri="{FF2B5EF4-FFF2-40B4-BE49-F238E27FC236}">
+                <a16:creationId xmlns:a16="http://schemas.microsoft.com/office/drawing/2014/main" id="{F7C61D9C-4201-40B2-8AA8-00C66E0E4A4A}"/>
+              </a:ext>
+            </a:extLst>
+          </p:cNvPr>
+          <p:cNvSpPr txBox="1"/>
+          <p:nvPr/>
+        </p:nvSpPr>
+        <p:spPr>
+          <a:xfrm>
+            <a:off x="621088" y="4663876"/>
+            <a:ext cx="4407805" cy="369332"/>
+          </a:xfrm>
+          <a:prstGeom prst="rect">
+            <a:avLst/>
+          </a:prstGeom>
+          <a:noFill/>
+        </p:spPr>
+        <p:txBody>
+          <a:bodyPr wrap="square" rtlCol="0">
+            <a:spAutoFit/>
+          </a:bodyPr>
+          <a:lstStyle/>
+          <a:p>
+            <a:r>
+              <a:rPr lang="fr-FR" dirty="0"/>
+              <a:t>Enregistrer les mesures dans la BDD</a:t>
+            </a:r>
+          </a:p>
+        </p:txBody>
+      </p:sp>
+      <p:sp>
+        <p:nvSpPr>
+          <p:cNvPr id="12" name="ZoneTexte 11">
+            <a:extLst>
+              <a:ext uri="{FF2B5EF4-FFF2-40B4-BE49-F238E27FC236}">
+                <a16:creationId xmlns:a16="http://schemas.microsoft.com/office/drawing/2014/main" id="{3621FA46-CFC3-4B0D-B245-5B42884C2809}"/>
+              </a:ext>
+            </a:extLst>
+          </p:cNvPr>
+          <p:cNvSpPr txBox="1"/>
+          <p:nvPr/>
+        </p:nvSpPr>
+        <p:spPr>
+          <a:xfrm>
+            <a:off x="6300132" y="1996015"/>
+            <a:ext cx="4026716" cy="369332"/>
+          </a:xfrm>
+          <a:prstGeom prst="rect">
+            <a:avLst/>
+          </a:prstGeom>
+          <a:noFill/>
+        </p:spPr>
+        <p:txBody>
+          <a:bodyPr wrap="square" rtlCol="0">
+            <a:spAutoFit/>
+          </a:bodyPr>
+          <a:lstStyle/>
+          <a:p>
+            <a:r>
+              <a:rPr lang="fr-FR" dirty="0"/>
+              <a:t>Programme Python sur </a:t>
+            </a:r>
+            <a:r>
+              <a:rPr lang="fr-FR" dirty="0" err="1"/>
+              <a:t>raspberry</a:t>
+            </a:r>
+            <a:endParaRPr lang="fr-FR" dirty="0"/>
+          </a:p>
+        </p:txBody>
+      </p:sp>
+      <p:sp>
+        <p:nvSpPr>
+          <p:cNvPr id="13" name="ZoneTexte 12">
+            <a:extLst>
+              <a:ext uri="{FF2B5EF4-FFF2-40B4-BE49-F238E27FC236}">
+                <a16:creationId xmlns:a16="http://schemas.microsoft.com/office/drawing/2014/main" id="{B2DCCCAC-4141-4C2F-A476-6F33E0340986}"/>
+              </a:ext>
+            </a:extLst>
+          </p:cNvPr>
+          <p:cNvSpPr txBox="1"/>
+          <p:nvPr/>
+        </p:nvSpPr>
+        <p:spPr>
+          <a:xfrm>
+            <a:off x="6300132" y="3400998"/>
+            <a:ext cx="3808602" cy="369332"/>
+          </a:xfrm>
+          <a:prstGeom prst="rect">
+            <a:avLst/>
+          </a:prstGeom>
+          <a:noFill/>
+        </p:spPr>
+        <p:txBody>
+          <a:bodyPr wrap="square" rtlCol="0">
+            <a:spAutoFit/>
+          </a:bodyPr>
+          <a:lstStyle/>
+          <a:p>
+            <a:r>
+              <a:rPr lang="fr-FR" dirty="0"/>
+              <a:t>Anémomètre connecté sur l’Arduino</a:t>
+            </a:r>
+          </a:p>
+        </p:txBody>
+      </p:sp>
+      <p:pic>
+        <p:nvPicPr>
+          <p:cNvPr id="33" name="Image 32">
+            <a:extLst>
+              <a:ext uri="{FF2B5EF4-FFF2-40B4-BE49-F238E27FC236}">
+                <a16:creationId xmlns:a16="http://schemas.microsoft.com/office/drawing/2014/main" id="{15AB5B42-5737-46D0-8440-4BC347E6F7E8}"/>
+              </a:ext>
+            </a:extLst>
+          </p:cNvPr>
+          <p:cNvPicPr>
+            <a:picLocks noChangeAspect="1"/>
+          </p:cNvPicPr>
+          <p:nvPr/>
+        </p:nvPicPr>
+        <p:blipFill>
+          <a:blip r:embed="rId4">
+            <a:extLst>
+              <a:ext uri="{28A0092B-C50C-407E-A947-70E740481C1C}">
+                <a14:useLocalDpi xmlns:a14="http://schemas.microsoft.com/office/drawing/2010/main" val="0"/>
+              </a:ext>
+            </a:extLst>
+          </a:blip>
+          <a:stretch>
+            <a:fillRect/>
+          </a:stretch>
+        </p:blipFill>
+        <p:spPr>
+          <a:xfrm>
+            <a:off x="10556836" y="3112263"/>
+            <a:ext cx="780337" cy="780337"/>
+          </a:xfrm>
+          <a:prstGeom prst="rect">
+            <a:avLst/>
+          </a:prstGeom>
+        </p:spPr>
+      </p:pic>
+      <p:pic>
+        <p:nvPicPr>
+          <p:cNvPr id="34" name="Image 33">
+            <a:extLst>
+              <a:ext uri="{FF2B5EF4-FFF2-40B4-BE49-F238E27FC236}">
+                <a16:creationId xmlns:a16="http://schemas.microsoft.com/office/drawing/2014/main" id="{EF2C9A80-F269-4328-894D-9A81B0415B4D}"/>
+              </a:ext>
+            </a:extLst>
+          </p:cNvPr>
+          <p:cNvPicPr>
+            <a:picLocks noChangeAspect="1"/>
+          </p:cNvPicPr>
+          <p:nvPr/>
+        </p:nvPicPr>
+        <p:blipFill>
+          <a:blip r:embed="rId5">
+            <a:extLst>
+              <a:ext uri="{28A0092B-C50C-407E-A947-70E740481C1C}">
+                <a14:useLocalDpi xmlns:a14="http://schemas.microsoft.com/office/drawing/2010/main" val="0"/>
+              </a:ext>
+            </a:extLst>
+          </a:blip>
+          <a:stretch>
+            <a:fillRect/>
+          </a:stretch>
+        </p:blipFill>
+        <p:spPr>
+          <a:xfrm>
+            <a:off x="10556836" y="1807223"/>
+            <a:ext cx="746916" cy="746916"/>
+          </a:xfrm>
+          <a:prstGeom prst="rect">
+            <a:avLst/>
+          </a:prstGeom>
+        </p:spPr>
+      </p:pic>
+      <p:pic>
+        <p:nvPicPr>
+          <p:cNvPr id="36" name="Image 35">
+            <a:extLst>
+              <a:ext uri="{FF2B5EF4-FFF2-40B4-BE49-F238E27FC236}">
+                <a16:creationId xmlns:a16="http://schemas.microsoft.com/office/drawing/2014/main" id="{874DB267-C4F5-4E9C-8407-82477BBED785}"/>
+              </a:ext>
+            </a:extLst>
+          </p:cNvPr>
+          <p:cNvPicPr>
+            <a:picLocks noChangeAspect="1"/>
+          </p:cNvPicPr>
+          <p:nvPr/>
+        </p:nvPicPr>
+        <p:blipFill>
+          <a:blip r:embed="rId6">
+            <a:extLst>
+              <a:ext uri="{28A0092B-C50C-407E-A947-70E740481C1C}">
+                <a14:useLocalDpi xmlns:a14="http://schemas.microsoft.com/office/drawing/2010/main" val="0"/>
+              </a:ext>
+            </a:extLst>
+          </a:blip>
+          <a:stretch>
+            <a:fillRect/>
+          </a:stretch>
+        </p:blipFill>
+        <p:spPr>
+          <a:xfrm>
+            <a:off x="4295354" y="1903843"/>
+            <a:ext cx="650296" cy="650296"/>
+          </a:xfrm>
+          <a:prstGeom prst="rect">
+            <a:avLst/>
+          </a:prstGeom>
+        </p:spPr>
+      </p:pic>
+      <p:pic>
+        <p:nvPicPr>
+          <p:cNvPr id="37" name="Image 36">
+            <a:extLst>
+              <a:ext uri="{FF2B5EF4-FFF2-40B4-BE49-F238E27FC236}">
+                <a16:creationId xmlns:a16="http://schemas.microsoft.com/office/drawing/2014/main" id="{1B49C3A6-8228-4388-9AB2-56DA289F93EC}"/>
+              </a:ext>
+            </a:extLst>
+          </p:cNvPr>
+          <p:cNvPicPr>
+            <a:picLocks noChangeAspect="1"/>
+          </p:cNvPicPr>
+          <p:nvPr/>
+        </p:nvPicPr>
+        <p:blipFill>
+          <a:blip r:embed="rId7">
+            <a:extLst>
+              <a:ext uri="{28A0092B-C50C-407E-A947-70E740481C1C}">
+                <a14:useLocalDpi xmlns:a14="http://schemas.microsoft.com/office/drawing/2010/main" val="0"/>
+              </a:ext>
+            </a:extLst>
+          </a:blip>
+          <a:stretch>
+            <a:fillRect/>
+          </a:stretch>
+        </p:blipFill>
+        <p:spPr>
+          <a:xfrm>
+            <a:off x="4104433" y="2640839"/>
+            <a:ext cx="924460" cy="1003812"/>
+          </a:xfrm>
+          <a:prstGeom prst="rect">
+            <a:avLst/>
+          </a:prstGeom>
+        </p:spPr>
+      </p:pic>
+      <p:pic>
+        <p:nvPicPr>
+          <p:cNvPr id="17" name="Image 16">
+            <a:extLst>
+              <a:ext uri="{FF2B5EF4-FFF2-40B4-BE49-F238E27FC236}">
+                <a16:creationId xmlns:a16="http://schemas.microsoft.com/office/drawing/2014/main" id="{BC5C124C-2E8A-4E56-A532-855B70A71335}"/>
+              </a:ext>
+            </a:extLst>
+          </p:cNvPr>
+          <p:cNvPicPr>
+            <a:picLocks noChangeAspect="1"/>
+          </p:cNvPicPr>
+          <p:nvPr/>
+        </p:nvPicPr>
+        <p:blipFill>
+          <a:blip r:embed="rId8">
+            <a:extLst>
+              <a:ext uri="{28A0092B-C50C-407E-A947-70E740481C1C}">
+                <a14:useLocalDpi xmlns:a14="http://schemas.microsoft.com/office/drawing/2010/main" val="0"/>
+              </a:ext>
+            </a:extLst>
+          </a:blip>
+          <a:stretch>
+            <a:fillRect/>
+          </a:stretch>
+        </p:blipFill>
+        <p:spPr>
+          <a:xfrm>
+            <a:off x="4213047" y="3720336"/>
+            <a:ext cx="650235" cy="650235"/>
+          </a:xfrm>
+          <a:prstGeom prst="rect">
+            <a:avLst/>
+          </a:prstGeom>
+        </p:spPr>
+      </p:pic>
+      <p:pic>
+        <p:nvPicPr>
+          <p:cNvPr id="40" name="Image 39">
+            <a:extLst>
+              <a:ext uri="{FF2B5EF4-FFF2-40B4-BE49-F238E27FC236}">
+                <a16:creationId xmlns:a16="http://schemas.microsoft.com/office/drawing/2014/main" id="{A0073266-6A39-42C3-86C0-3624335CBCED}"/>
+              </a:ext>
+            </a:extLst>
+          </p:cNvPr>
+          <p:cNvPicPr>
+            <a:picLocks noChangeAspect="1"/>
+          </p:cNvPicPr>
+          <p:nvPr/>
+        </p:nvPicPr>
+        <p:blipFill>
+          <a:blip r:embed="rId9">
+            <a:extLst>
+              <a:ext uri="{28A0092B-C50C-407E-A947-70E740481C1C}">
+                <a14:useLocalDpi xmlns:a14="http://schemas.microsoft.com/office/drawing/2010/main" val="0"/>
+              </a:ext>
+            </a:extLst>
+          </a:blip>
+          <a:stretch>
+            <a:fillRect/>
+          </a:stretch>
+        </p:blipFill>
+        <p:spPr>
+          <a:xfrm>
+            <a:off x="4313247" y="4675385"/>
+            <a:ext cx="715646" cy="715646"/>
+          </a:xfrm>
+          <a:prstGeom prst="rect">
+            <a:avLst/>
+          </a:prstGeom>
+        </p:spPr>
+      </p:pic>
     </p:spTree>
     <p:extLst>
       <p:ext uri="{BB962C8B-B14F-4D97-AF65-F5344CB8AC3E}">
-        <p14:creationId xmlns:p14="http://schemas.microsoft.com/office/powerpoint/2010/main" val="2016876074"/>
+        <p14:creationId xmlns:p14="http://schemas.microsoft.com/office/powerpoint/2010/main" val="113769124"/>
       </p:ext>
     </p:extLst>
   </p:cSld>
@@ -22672,6 +23976,434 @@
       </p:transition>
     </mc:Fallback>
   </mc:AlternateContent>
+  <p:timing>
+    <p:tnLst>
+      <p:par>
+        <p:cTn id="1" dur="indefinite" restart="never" nodeType="tmRoot">
+          <p:childTnLst>
+            <p:seq concurrent="1" nextAc="seek">
+              <p:cTn id="2" dur="indefinite" nodeType="mainSeq">
+                <p:childTnLst>
+                  <p:par>
+                    <p:cTn id="3" fill="hold">
+                      <p:stCondLst>
+                        <p:cond delay="indefinite"/>
+                        <p:cond evt="onBegin" delay="0">
+                          <p:tn val="2"/>
+                        </p:cond>
+                      </p:stCondLst>
+                      <p:childTnLst>
+                        <p:par>
+                          <p:cTn id="4" fill="hold">
+                            <p:stCondLst>
+                              <p:cond delay="0"/>
+                            </p:stCondLst>
+                            <p:childTnLst>
+                              <p:par>
+                                <p:cTn id="5" presetID="42" presetClass="entr" presetSubtype="0" fill="hold" nodeType="withEffect">
+                                  <p:stCondLst>
+                                    <p:cond delay="0"/>
+                                  </p:stCondLst>
+                                  <p:childTnLst>
+                                    <p:set>
+                                      <p:cBhvr>
+                                        <p:cTn id="6" dur="1" fill="hold">
+                                          <p:stCondLst>
+                                            <p:cond delay="0"/>
+                                          </p:stCondLst>
+                                        </p:cTn>
+                                        <p:tgtEl>
+                                          <p:spTgt spid="33"/>
+                                        </p:tgtEl>
+                                        <p:attrNameLst>
+                                          <p:attrName>style.visibility</p:attrName>
+                                        </p:attrNameLst>
+                                      </p:cBhvr>
+                                      <p:to>
+                                        <p:strVal val="visible"/>
+                                      </p:to>
+                                    </p:set>
+                                    <p:animEffect transition="in" filter="fade">
+                                      <p:cBhvr>
+                                        <p:cTn id="7" dur="1000"/>
+                                        <p:tgtEl>
+                                          <p:spTgt spid="33"/>
+                                        </p:tgtEl>
+                                      </p:cBhvr>
+                                    </p:animEffect>
+                                    <p:anim calcmode="lin" valueType="num">
+                                      <p:cBhvr>
+                                        <p:cTn id="8" dur="1000" fill="hold"/>
+                                        <p:tgtEl>
+                                          <p:spTgt spid="33"/>
+                                        </p:tgtEl>
+                                        <p:attrNameLst>
+                                          <p:attrName>ppt_x</p:attrName>
+                                        </p:attrNameLst>
+                                      </p:cBhvr>
+                                      <p:tavLst>
+                                        <p:tav tm="0">
+                                          <p:val>
+                                            <p:strVal val="#ppt_x"/>
+                                          </p:val>
+                                        </p:tav>
+                                        <p:tav tm="100000">
+                                          <p:val>
+                                            <p:strVal val="#ppt_x"/>
+                                          </p:val>
+                                        </p:tav>
+                                      </p:tavLst>
+                                    </p:anim>
+                                    <p:anim calcmode="lin" valueType="num">
+                                      <p:cBhvr>
+                                        <p:cTn id="9" dur="1000" fill="hold"/>
+                                        <p:tgtEl>
+                                          <p:spTgt spid="33"/>
+                                        </p:tgtEl>
+                                        <p:attrNameLst>
+                                          <p:attrName>ppt_y</p:attrName>
+                                        </p:attrNameLst>
+                                      </p:cBhvr>
+                                      <p:tavLst>
+                                        <p:tav tm="0">
+                                          <p:val>
+                                            <p:strVal val="#ppt_y+.1"/>
+                                          </p:val>
+                                        </p:tav>
+                                        <p:tav tm="100000">
+                                          <p:val>
+                                            <p:strVal val="#ppt_y"/>
+                                          </p:val>
+                                        </p:tav>
+                                      </p:tavLst>
+                                    </p:anim>
+                                  </p:childTnLst>
+                                </p:cTn>
+                              </p:par>
+                              <p:par>
+                                <p:cTn id="10" presetID="42" presetClass="entr" presetSubtype="0" fill="hold" nodeType="withEffect">
+                                  <p:stCondLst>
+                                    <p:cond delay="0"/>
+                                  </p:stCondLst>
+                                  <p:childTnLst>
+                                    <p:set>
+                                      <p:cBhvr>
+                                        <p:cTn id="11" dur="1" fill="hold">
+                                          <p:stCondLst>
+                                            <p:cond delay="0"/>
+                                          </p:stCondLst>
+                                        </p:cTn>
+                                        <p:tgtEl>
+                                          <p:spTgt spid="34"/>
+                                        </p:tgtEl>
+                                        <p:attrNameLst>
+                                          <p:attrName>style.visibility</p:attrName>
+                                        </p:attrNameLst>
+                                      </p:cBhvr>
+                                      <p:to>
+                                        <p:strVal val="visible"/>
+                                      </p:to>
+                                    </p:set>
+                                    <p:animEffect transition="in" filter="fade">
+                                      <p:cBhvr>
+                                        <p:cTn id="12" dur="1000"/>
+                                        <p:tgtEl>
+                                          <p:spTgt spid="34"/>
+                                        </p:tgtEl>
+                                      </p:cBhvr>
+                                    </p:animEffect>
+                                    <p:anim calcmode="lin" valueType="num">
+                                      <p:cBhvr>
+                                        <p:cTn id="13" dur="1000" fill="hold"/>
+                                        <p:tgtEl>
+                                          <p:spTgt spid="34"/>
+                                        </p:tgtEl>
+                                        <p:attrNameLst>
+                                          <p:attrName>ppt_x</p:attrName>
+                                        </p:attrNameLst>
+                                      </p:cBhvr>
+                                      <p:tavLst>
+                                        <p:tav tm="0">
+                                          <p:val>
+                                            <p:strVal val="#ppt_x"/>
+                                          </p:val>
+                                        </p:tav>
+                                        <p:tav tm="100000">
+                                          <p:val>
+                                            <p:strVal val="#ppt_x"/>
+                                          </p:val>
+                                        </p:tav>
+                                      </p:tavLst>
+                                    </p:anim>
+                                    <p:anim calcmode="lin" valueType="num">
+                                      <p:cBhvr>
+                                        <p:cTn id="14" dur="1000" fill="hold"/>
+                                        <p:tgtEl>
+                                          <p:spTgt spid="34"/>
+                                        </p:tgtEl>
+                                        <p:attrNameLst>
+                                          <p:attrName>ppt_y</p:attrName>
+                                        </p:attrNameLst>
+                                      </p:cBhvr>
+                                      <p:tavLst>
+                                        <p:tav tm="0">
+                                          <p:val>
+                                            <p:strVal val="#ppt_y+.1"/>
+                                          </p:val>
+                                        </p:tav>
+                                        <p:tav tm="100000">
+                                          <p:val>
+                                            <p:strVal val="#ppt_y"/>
+                                          </p:val>
+                                        </p:tav>
+                                      </p:tavLst>
+                                    </p:anim>
+                                  </p:childTnLst>
+                                </p:cTn>
+                              </p:par>
+                              <p:par>
+                                <p:cTn id="15" presetID="42" presetClass="entr" presetSubtype="0" fill="hold" nodeType="withEffect">
+                                  <p:stCondLst>
+                                    <p:cond delay="0"/>
+                                  </p:stCondLst>
+                                  <p:childTnLst>
+                                    <p:set>
+                                      <p:cBhvr>
+                                        <p:cTn id="16" dur="1" fill="hold">
+                                          <p:stCondLst>
+                                            <p:cond delay="0"/>
+                                          </p:stCondLst>
+                                        </p:cTn>
+                                        <p:tgtEl>
+                                          <p:spTgt spid="36"/>
+                                        </p:tgtEl>
+                                        <p:attrNameLst>
+                                          <p:attrName>style.visibility</p:attrName>
+                                        </p:attrNameLst>
+                                      </p:cBhvr>
+                                      <p:to>
+                                        <p:strVal val="visible"/>
+                                      </p:to>
+                                    </p:set>
+                                    <p:animEffect transition="in" filter="fade">
+                                      <p:cBhvr>
+                                        <p:cTn id="17" dur="1000"/>
+                                        <p:tgtEl>
+                                          <p:spTgt spid="36"/>
+                                        </p:tgtEl>
+                                      </p:cBhvr>
+                                    </p:animEffect>
+                                    <p:anim calcmode="lin" valueType="num">
+                                      <p:cBhvr>
+                                        <p:cTn id="18" dur="1000" fill="hold"/>
+                                        <p:tgtEl>
+                                          <p:spTgt spid="36"/>
+                                        </p:tgtEl>
+                                        <p:attrNameLst>
+                                          <p:attrName>ppt_x</p:attrName>
+                                        </p:attrNameLst>
+                                      </p:cBhvr>
+                                      <p:tavLst>
+                                        <p:tav tm="0">
+                                          <p:val>
+                                            <p:strVal val="#ppt_x"/>
+                                          </p:val>
+                                        </p:tav>
+                                        <p:tav tm="100000">
+                                          <p:val>
+                                            <p:strVal val="#ppt_x"/>
+                                          </p:val>
+                                        </p:tav>
+                                      </p:tavLst>
+                                    </p:anim>
+                                    <p:anim calcmode="lin" valueType="num">
+                                      <p:cBhvr>
+                                        <p:cTn id="19" dur="1000" fill="hold"/>
+                                        <p:tgtEl>
+                                          <p:spTgt spid="36"/>
+                                        </p:tgtEl>
+                                        <p:attrNameLst>
+                                          <p:attrName>ppt_y</p:attrName>
+                                        </p:attrNameLst>
+                                      </p:cBhvr>
+                                      <p:tavLst>
+                                        <p:tav tm="0">
+                                          <p:val>
+                                            <p:strVal val="#ppt_y+.1"/>
+                                          </p:val>
+                                        </p:tav>
+                                        <p:tav tm="100000">
+                                          <p:val>
+                                            <p:strVal val="#ppt_y"/>
+                                          </p:val>
+                                        </p:tav>
+                                      </p:tavLst>
+                                    </p:anim>
+                                  </p:childTnLst>
+                                </p:cTn>
+                              </p:par>
+                              <p:par>
+                                <p:cTn id="20" presetID="42" presetClass="entr" presetSubtype="0" fill="hold" nodeType="withEffect">
+                                  <p:stCondLst>
+                                    <p:cond delay="0"/>
+                                  </p:stCondLst>
+                                  <p:childTnLst>
+                                    <p:set>
+                                      <p:cBhvr>
+                                        <p:cTn id="21" dur="1" fill="hold">
+                                          <p:stCondLst>
+                                            <p:cond delay="0"/>
+                                          </p:stCondLst>
+                                        </p:cTn>
+                                        <p:tgtEl>
+                                          <p:spTgt spid="37"/>
+                                        </p:tgtEl>
+                                        <p:attrNameLst>
+                                          <p:attrName>style.visibility</p:attrName>
+                                        </p:attrNameLst>
+                                      </p:cBhvr>
+                                      <p:to>
+                                        <p:strVal val="visible"/>
+                                      </p:to>
+                                    </p:set>
+                                    <p:animEffect transition="in" filter="fade">
+                                      <p:cBhvr>
+                                        <p:cTn id="22" dur="1000"/>
+                                        <p:tgtEl>
+                                          <p:spTgt spid="37"/>
+                                        </p:tgtEl>
+                                      </p:cBhvr>
+                                    </p:animEffect>
+                                    <p:anim calcmode="lin" valueType="num">
+                                      <p:cBhvr>
+                                        <p:cTn id="23" dur="1000" fill="hold"/>
+                                        <p:tgtEl>
+                                          <p:spTgt spid="37"/>
+                                        </p:tgtEl>
+                                        <p:attrNameLst>
+                                          <p:attrName>ppt_x</p:attrName>
+                                        </p:attrNameLst>
+                                      </p:cBhvr>
+                                      <p:tavLst>
+                                        <p:tav tm="0">
+                                          <p:val>
+                                            <p:strVal val="#ppt_x"/>
+                                          </p:val>
+                                        </p:tav>
+                                        <p:tav tm="100000">
+                                          <p:val>
+                                            <p:strVal val="#ppt_x"/>
+                                          </p:val>
+                                        </p:tav>
+                                      </p:tavLst>
+                                    </p:anim>
+                                    <p:anim calcmode="lin" valueType="num">
+                                      <p:cBhvr>
+                                        <p:cTn id="24" dur="1000" fill="hold"/>
+                                        <p:tgtEl>
+                                          <p:spTgt spid="37"/>
+                                        </p:tgtEl>
+                                        <p:attrNameLst>
+                                          <p:attrName>ppt_y</p:attrName>
+                                        </p:attrNameLst>
+                                      </p:cBhvr>
+                                      <p:tavLst>
+                                        <p:tav tm="0">
+                                          <p:val>
+                                            <p:strVal val="#ppt_y+.1"/>
+                                          </p:val>
+                                        </p:tav>
+                                        <p:tav tm="100000">
+                                          <p:val>
+                                            <p:strVal val="#ppt_y"/>
+                                          </p:val>
+                                        </p:tav>
+                                      </p:tavLst>
+                                    </p:anim>
+                                  </p:childTnLst>
+                                </p:cTn>
+                              </p:par>
+                            </p:childTnLst>
+                          </p:cTn>
+                        </p:par>
+                      </p:childTnLst>
+                    </p:cTn>
+                  </p:par>
+                  <p:par>
+                    <p:cTn id="25" fill="hold">
+                      <p:stCondLst>
+                        <p:cond delay="indefinite"/>
+                      </p:stCondLst>
+                      <p:childTnLst>
+                        <p:par>
+                          <p:cTn id="26" fill="hold">
+                            <p:stCondLst>
+                              <p:cond delay="0"/>
+                            </p:stCondLst>
+                            <p:childTnLst>
+                              <p:par>
+                                <p:cTn id="27" presetID="10" presetClass="entr" presetSubtype="0" fill="hold" nodeType="clickEffect">
+                                  <p:stCondLst>
+                                    <p:cond delay="0"/>
+                                  </p:stCondLst>
+                                  <p:childTnLst>
+                                    <p:set>
+                                      <p:cBhvr>
+                                        <p:cTn id="28" dur="1" fill="hold">
+                                          <p:stCondLst>
+                                            <p:cond delay="0"/>
+                                          </p:stCondLst>
+                                        </p:cTn>
+                                        <p:tgtEl>
+                                          <p:spTgt spid="40"/>
+                                        </p:tgtEl>
+                                        <p:attrNameLst>
+                                          <p:attrName>style.visibility</p:attrName>
+                                        </p:attrNameLst>
+                                      </p:cBhvr>
+                                      <p:to>
+                                        <p:strVal val="visible"/>
+                                      </p:to>
+                                    </p:set>
+                                    <p:animEffect transition="in" filter="fade">
+                                      <p:cBhvr>
+                                        <p:cTn id="29" dur="500"/>
+                                        <p:tgtEl>
+                                          <p:spTgt spid="40"/>
+                                        </p:tgtEl>
+                                      </p:cBhvr>
+                                    </p:animEffect>
+                                  </p:childTnLst>
+                                </p:cTn>
+                              </p:par>
+                            </p:childTnLst>
+                          </p:cTn>
+                        </p:par>
+                      </p:childTnLst>
+                    </p:cTn>
+                  </p:par>
+                </p:childTnLst>
+              </p:cTn>
+              <p:prevCondLst>
+                <p:cond evt="onPrev" delay="0">
+                  <p:tgtEl>
+                    <p:sldTgt/>
+                  </p:tgtEl>
+                </p:cond>
+              </p:prevCondLst>
+              <p:nextCondLst>
+                <p:cond evt="onNext" delay="0">
+                  <p:tgtEl>
+                    <p:sldTgt/>
+                  </p:tgtEl>
+                </p:cond>
+              </p:nextCondLst>
+            </p:seq>
+          </p:childTnLst>
+        </p:cTn>
+      </p:par>
+    </p:tnLst>
+  </p:timing>
 </p:sld>
 </file>
 

</xml_diff>